<commit_message>
final update on Common word Practice
</commit_message>
<xml_diff>
--- a/Mid Presentation.pptx
+++ b/Mid Presentation.pptx
@@ -5,19 +5,28 @@
     <p:sldMasterId id="2147483648" r:id="rId1"/>
   </p:sldMasterIdLst>
   <p:notesMasterIdLst>
-    <p:notesMasterId r:id="rId12"/>
+    <p:notesMasterId r:id="rId21"/>
   </p:notesMasterIdLst>
   <p:sldIdLst>
     <p:sldId id="258" r:id="rId2"/>
-    <p:sldId id="259" r:id="rId3"/>
-    <p:sldId id="260" r:id="rId4"/>
-    <p:sldId id="263" r:id="rId5"/>
-    <p:sldId id="262" r:id="rId6"/>
-    <p:sldId id="265" r:id="rId7"/>
-    <p:sldId id="264" r:id="rId8"/>
-    <p:sldId id="261" r:id="rId9"/>
-    <p:sldId id="266" r:id="rId10"/>
-    <p:sldId id="267" r:id="rId11"/>
+    <p:sldId id="273" r:id="rId3"/>
+    <p:sldId id="259" r:id="rId4"/>
+    <p:sldId id="274" r:id="rId5"/>
+    <p:sldId id="260" r:id="rId6"/>
+    <p:sldId id="263" r:id="rId7"/>
+    <p:sldId id="262" r:id="rId8"/>
+    <p:sldId id="265" r:id="rId9"/>
+    <p:sldId id="264" r:id="rId10"/>
+    <p:sldId id="261" r:id="rId11"/>
+    <p:sldId id="266" r:id="rId12"/>
+    <p:sldId id="267" r:id="rId13"/>
+    <p:sldId id="275" r:id="rId14"/>
+    <p:sldId id="268" r:id="rId15"/>
+    <p:sldId id="269" r:id="rId16"/>
+    <p:sldId id="277" r:id="rId17"/>
+    <p:sldId id="270" r:id="rId18"/>
+    <p:sldId id="272" r:id="rId19"/>
+    <p:sldId id="276" r:id="rId20"/>
   </p:sldIdLst>
   <p:sldSz cx="12192000" cy="6858000"/>
   <p:notesSz cx="6858000" cy="9144000"/>
@@ -206,7 +215,7 @@
           <a:p>
             <a:fld id="{1DDADBE3-1417-4B97-828D-BDCB742D4EDD}" type="datetimeFigureOut">
               <a:rPr lang="en-US" smtClean="0"/>
-              <a:t>06-Sep-23</a:t>
+              <a:t>08-Sep-23</a:t>
             </a:fld>
             <a:endParaRPr lang="en-US"/>
           </a:p>
@@ -690,7 +699,7 @@
           <a:p>
             <a:fld id="{9AB3A824-1A51-4B26-AD58-A6D8E14F6C04}" type="datetimeFigureOut">
               <a:rPr lang="en-US" dirty="0"/>
-              <a:t>06-Sep-23</a:t>
+              <a:t>08-Sep-23</a:t>
             </a:fld>
             <a:endParaRPr lang="en-US" dirty="0"/>
           </a:p>
@@ -1024,7 +1033,7 @@
           <a:p>
             <a:fld id="{D857E33E-8B18-4087-B112-809917729534}" type="datetimeFigureOut">
               <a:rPr lang="en-US" dirty="0"/>
-              <a:t>06-Sep-23</a:t>
+              <a:t>08-Sep-23</a:t>
             </a:fld>
             <a:endParaRPr lang="en-US" dirty="0"/>
           </a:p>
@@ -1326,7 +1335,7 @@
           <a:p>
             <a:fld id="{D3FFE419-2371-464F-8239-3959401C3561}" type="datetimeFigureOut">
               <a:rPr lang="en-US" dirty="0"/>
-              <a:t>06-Sep-23</a:t>
+              <a:t>08-Sep-23</a:t>
             </a:fld>
             <a:endParaRPr lang="en-US" dirty="0"/>
           </a:p>
@@ -1573,7 +1582,7 @@
           <a:p>
             <a:fld id="{97D162C4-EDD9-4389-A98B-B87ECEA2A816}" type="datetimeFigureOut">
               <a:rPr lang="en-US" dirty="0"/>
-              <a:t>06-Sep-23</a:t>
+              <a:t>08-Sep-23</a:t>
             </a:fld>
             <a:endParaRPr lang="en-US" dirty="0"/>
           </a:p>
@@ -1980,7 +1989,7 @@
           <a:p>
             <a:fld id="{3E5059C3-6A89-4494-99FF-5A4D6FFD50EB}" type="datetimeFigureOut">
               <a:rPr lang="en-US" dirty="0"/>
-              <a:t>06-Sep-23</a:t>
+              <a:t>08-Sep-23</a:t>
             </a:fld>
             <a:endParaRPr lang="en-US" dirty="0"/>
           </a:p>
@@ -2294,7 +2303,7 @@
           <a:p>
             <a:fld id="{CA954B2F-12DE-47F5-8894-472B206D2E1E}" type="datetimeFigureOut">
               <a:rPr lang="en-US" dirty="0"/>
-              <a:t>06-Sep-23</a:t>
+              <a:t>08-Sep-23</a:t>
             </a:fld>
             <a:endParaRPr lang="en-US" dirty="0"/>
           </a:p>
@@ -2838,7 +2847,7 @@
           <a:p>
             <a:fld id="{3F30E46F-7819-4ACF-B48B-48222C2ACC88}" type="datetimeFigureOut">
               <a:rPr lang="en-US" dirty="0"/>
-              <a:t>06-Sep-23</a:t>
+              <a:t>08-Sep-23</a:t>
             </a:fld>
             <a:endParaRPr lang="en-US" dirty="0"/>
           </a:p>
@@ -3033,7 +3042,7 @@
           <a:p>
             <a:fld id="{1FAF3416-4057-4DAA-829D-4CA07428D088}" type="datetimeFigureOut">
               <a:rPr lang="en-US" dirty="0"/>
-              <a:t>06-Sep-23</a:t>
+              <a:t>08-Sep-23</a:t>
             </a:fld>
             <a:endParaRPr lang="en-US" dirty="0"/>
           </a:p>
@@ -3246,7 +3255,7 @@
           <a:p>
             <a:fld id="{921D9284-D300-4297-87F7-E791DCC15DB1}" type="datetimeFigureOut">
               <a:rPr lang="en-US" dirty="0"/>
-              <a:t>06-Sep-23</a:t>
+              <a:t>08-Sep-23</a:t>
             </a:fld>
             <a:endParaRPr lang="en-US" dirty="0"/>
           </a:p>
@@ -3615,7 +3624,7 @@
           <a:p>
             <a:fld id="{37D525BB-DA17-4BA0-B3C8-3AC3ABC827E6}" type="datetimeFigureOut">
               <a:rPr lang="en-US" dirty="0"/>
-              <a:t>06-Sep-23</a:t>
+              <a:t>08-Sep-23</a:t>
             </a:fld>
             <a:endParaRPr lang="en-US" dirty="0"/>
           </a:p>
@@ -4018,7 +4027,7 @@
           <a:p>
             <a:fld id="{B16C4C9A-3960-41CF-A4E9-2A8FB932454B}" type="datetimeFigureOut">
               <a:rPr lang="en-US" dirty="0"/>
-              <a:t>06-Sep-23</a:t>
+              <a:t>08-Sep-23</a:t>
             </a:fld>
             <a:endParaRPr lang="en-US" dirty="0"/>
           </a:p>
@@ -4329,7 +4338,7 @@
           <a:p>
             <a:fld id="{3CBC1C18-307B-4F68-A007-B5B542270E8D}" type="datetimeFigureOut">
               <a:rPr lang="en-US" dirty="0"/>
-              <a:t>06-Sep-23</a:t>
+              <a:t>08-Sep-23</a:t>
             </a:fld>
             <a:endParaRPr lang="en-US" dirty="0"/>
           </a:p>
@@ -5091,1039 +5100,6 @@
           <a:chExt cx="0" cy="0"/>
         </a:xfrm>
       </p:grpSpPr>
-      <p:sp>
-        <p:nvSpPr>
-          <p:cNvPr id="2" name="TextBox 1">
-            <a:extLst>
-              <a:ext uri="{FF2B5EF4-FFF2-40B4-BE49-F238E27FC236}">
-                <a16:creationId xmlns:a16="http://schemas.microsoft.com/office/drawing/2014/main" id="{A18B765C-7C33-497C-8A3C-A12FF7958380}"/>
-              </a:ext>
-            </a:extLst>
-          </p:cNvPr>
-          <p:cNvSpPr txBox="1"/>
-          <p:nvPr/>
-        </p:nvSpPr>
-        <p:spPr>
-          <a:xfrm>
-            <a:off x="1818860" y="327992"/>
-            <a:ext cx="7444409" cy="584775"/>
-          </a:xfrm>
-          <a:prstGeom prst="rect">
-            <a:avLst/>
-          </a:prstGeom>
-          <a:noFill/>
-        </p:spPr>
-        <p:txBody>
-          <a:bodyPr wrap="square" rtlCol="0">
-            <a:spAutoFit/>
-          </a:bodyPr>
-          <a:lstStyle/>
-          <a:p>
-            <a:r>
-              <a:rPr lang="en-US" sz="3200" dirty="0">
-                <a:latin typeface="Consolas" panose="020B0609020204030204" pitchFamily="49" charset="0"/>
-              </a:rPr>
-              <a:t>Statistics: Performance History</a:t>
-            </a:r>
-          </a:p>
-        </p:txBody>
-      </p:sp>
-      <p:pic>
-        <p:nvPicPr>
-          <p:cNvPr id="8" name="Picture 7">
-            <a:extLst>
-              <a:ext uri="{FF2B5EF4-FFF2-40B4-BE49-F238E27FC236}">
-                <a16:creationId xmlns:a16="http://schemas.microsoft.com/office/drawing/2014/main" id="{8B986A0B-E180-47B5-9E36-37DEF9DDB796}"/>
-              </a:ext>
-            </a:extLst>
-          </p:cNvPr>
-          <p:cNvPicPr>
-            <a:picLocks noChangeAspect="1"/>
-          </p:cNvPicPr>
-          <p:nvPr/>
-        </p:nvPicPr>
-        <p:blipFill>
-          <a:blip r:embed="rId2"/>
-          <a:stretch>
-            <a:fillRect/>
-          </a:stretch>
-        </p:blipFill>
-        <p:spPr>
-          <a:xfrm>
-            <a:off x="1371600" y="1131427"/>
-            <a:ext cx="10306878" cy="3311659"/>
-          </a:xfrm>
-          <a:prstGeom prst="rect">
-            <a:avLst/>
-          </a:prstGeom>
-        </p:spPr>
-      </p:pic>
-      <p:sp>
-        <p:nvSpPr>
-          <p:cNvPr id="9" name="TextBox 8">
-            <a:extLst>
-              <a:ext uri="{FF2B5EF4-FFF2-40B4-BE49-F238E27FC236}">
-                <a16:creationId xmlns:a16="http://schemas.microsoft.com/office/drawing/2014/main" id="{413CAD0D-6EE8-41AD-94A2-38D61A4D2DAD}"/>
-              </a:ext>
-            </a:extLst>
-          </p:cNvPr>
-          <p:cNvSpPr txBox="1"/>
-          <p:nvPr/>
-        </p:nvSpPr>
-        <p:spPr>
-          <a:xfrm>
-            <a:off x="1371600" y="4760843"/>
-            <a:ext cx="9044609" cy="1569660"/>
-          </a:xfrm>
-          <a:prstGeom prst="rect">
-            <a:avLst/>
-          </a:prstGeom>
-          <a:noFill/>
-        </p:spPr>
-        <p:txBody>
-          <a:bodyPr wrap="square" rtlCol="0">
-            <a:spAutoFit/>
-          </a:bodyPr>
-          <a:lstStyle/>
-          <a:p>
-            <a:r>
-              <a:rPr lang="en-US" sz="2400" dirty="0">
-                <a:latin typeface="Bahnschrift SemiBold" panose="020B0502040204020203" pitchFamily="34" charset="0"/>
-              </a:rPr>
-              <a:t>Users’ performance on each lesson or Game will be stored so that user can check his performance history. It stores Tutorial number, Date, Number of key press, wrong key press, Accuracy, Score. </a:t>
-            </a:r>
-          </a:p>
-        </p:txBody>
-      </p:sp>
-    </p:spTree>
-    <p:extLst>
-      <p:ext uri="{BB962C8B-B14F-4D97-AF65-F5344CB8AC3E}">
-        <p14:creationId xmlns:p14="http://schemas.microsoft.com/office/powerpoint/2010/main" val="1015052894"/>
-      </p:ext>
-    </p:extLst>
-  </p:cSld>
-  <p:clrMapOvr>
-    <a:masterClrMapping/>
-  </p:clrMapOvr>
-</p:sld>
-</file>
-
-<file path=ppt/slides/slide2.xml><?xml version="1.0" encoding="utf-8"?>
-<p:sld xmlns:a="http://schemas.openxmlformats.org/drawingml/2006/main" xmlns:r="http://schemas.openxmlformats.org/officeDocument/2006/relationships" xmlns:p="http://schemas.openxmlformats.org/presentationml/2006/main">
-  <p:cSld>
-    <p:spTree>
-      <p:nvGrpSpPr>
-        <p:cNvPr id="1" name=""/>
-        <p:cNvGrpSpPr/>
-        <p:nvPr/>
-      </p:nvGrpSpPr>
-      <p:grpSpPr>
-        <a:xfrm>
-          <a:off x="0" y="0"/>
-          <a:ext cx="0" cy="0"/>
-          <a:chOff x="0" y="0"/>
-          <a:chExt cx="0" cy="0"/>
-        </a:xfrm>
-      </p:grpSpPr>
-      <p:sp>
-        <p:nvSpPr>
-          <p:cNvPr id="2" name="TextBox 1">
-            <a:extLst>
-              <a:ext uri="{FF2B5EF4-FFF2-40B4-BE49-F238E27FC236}">
-                <a16:creationId xmlns:a16="http://schemas.microsoft.com/office/drawing/2014/main" id="{F10BF01C-0551-43BD-ABF9-9CE7422C8B2D}"/>
-              </a:ext>
-            </a:extLst>
-          </p:cNvPr>
-          <p:cNvSpPr txBox="1"/>
-          <p:nvPr/>
-        </p:nvSpPr>
-        <p:spPr>
-          <a:xfrm>
-            <a:off x="1272209" y="550117"/>
-            <a:ext cx="6152321" cy="584775"/>
-          </a:xfrm>
-          <a:prstGeom prst="rect">
-            <a:avLst/>
-          </a:prstGeom>
-          <a:noFill/>
-        </p:spPr>
-        <p:txBody>
-          <a:bodyPr wrap="square" rtlCol="0">
-            <a:spAutoFit/>
-          </a:bodyPr>
-          <a:lstStyle/>
-          <a:p>
-            <a:r>
-              <a:rPr lang="en-US" sz="3200" dirty="0">
-                <a:latin typeface="Bahnschrift SemiBold" panose="020B0502040204020203" pitchFamily="34" charset="0"/>
-              </a:rPr>
-              <a:t>Project Outline</a:t>
-            </a:r>
-          </a:p>
-        </p:txBody>
-      </p:sp>
-      <p:sp>
-        <p:nvSpPr>
-          <p:cNvPr id="3" name="TextBox 2">
-            <a:extLst>
-              <a:ext uri="{FF2B5EF4-FFF2-40B4-BE49-F238E27FC236}">
-                <a16:creationId xmlns:a16="http://schemas.microsoft.com/office/drawing/2014/main" id="{ED775F47-6732-49A0-893E-D7EDCCA0B8FE}"/>
-              </a:ext>
-            </a:extLst>
-          </p:cNvPr>
-          <p:cNvSpPr txBox="1"/>
-          <p:nvPr/>
-        </p:nvSpPr>
-        <p:spPr>
-          <a:xfrm>
-            <a:off x="1272209" y="1391477"/>
-            <a:ext cx="9660834" cy="4524315"/>
-          </a:xfrm>
-          <a:prstGeom prst="rect">
-            <a:avLst/>
-          </a:prstGeom>
-          <a:noFill/>
-        </p:spPr>
-        <p:txBody>
-          <a:bodyPr wrap="square" rtlCol="0">
-            <a:spAutoFit/>
-          </a:bodyPr>
-          <a:lstStyle/>
-          <a:p>
-            <a:pPr algn="just"/>
-            <a:r>
-              <a:rPr lang="en-US" sz="2400" dirty="0">
-                <a:latin typeface="Proxima Nova"/>
-                <a:sym typeface="Proxima Nova"/>
-              </a:rPr>
-              <a:t>“Typing tutor and Typing Game” project is an interactive application that aims to improve users’ typing skill through 3 major features. </a:t>
-            </a:r>
-          </a:p>
-          <a:p>
-            <a:pPr algn="just"/>
-            <a:endParaRPr lang="en-US" sz="2400" dirty="0">
-              <a:latin typeface="Proxima Nova"/>
-              <a:sym typeface="Proxima Nova"/>
-            </a:endParaRPr>
-          </a:p>
-          <a:p>
-            <a:pPr algn="just"/>
-            <a:r>
-              <a:rPr lang="en-US" sz="2400" b="1" dirty="0">
-                <a:latin typeface="Proxima Nova"/>
-                <a:sym typeface="Proxima Nova"/>
-              </a:rPr>
-              <a:t>Typing Tutorial </a:t>
-            </a:r>
-            <a:r>
-              <a:rPr lang="en-US" sz="2400" dirty="0">
-                <a:latin typeface="Proxima Nova"/>
-                <a:sym typeface="Proxima Nova"/>
-              </a:rPr>
-              <a:t>feature provides some technique and helpful rules for fast typing </a:t>
-            </a:r>
-          </a:p>
-          <a:p>
-            <a:pPr algn="just"/>
-            <a:endParaRPr lang="en-US" sz="2400" b="1" dirty="0">
-              <a:latin typeface="Proxima Nova"/>
-              <a:sym typeface="Proxima Nova"/>
-            </a:endParaRPr>
-          </a:p>
-          <a:p>
-            <a:pPr algn="just"/>
-            <a:r>
-              <a:rPr lang="en-US" sz="2400" b="1" dirty="0">
-                <a:latin typeface="Proxima Nova"/>
-                <a:sym typeface="Proxima Nova"/>
-              </a:rPr>
-              <a:t>Practice mode </a:t>
-            </a:r>
-            <a:r>
-              <a:rPr lang="en-US" sz="2400" dirty="0">
-                <a:latin typeface="Proxima Nova"/>
-                <a:sym typeface="Proxima Nova"/>
-              </a:rPr>
-              <a:t>gives users an opportunity to improve typing skill </a:t>
-            </a:r>
-            <a:r>
-              <a:rPr lang="en-US" sz="2400" dirty="0" err="1">
-                <a:latin typeface="Proxima Nova"/>
-                <a:sym typeface="Proxima Nova"/>
-              </a:rPr>
-              <a:t>thorugh</a:t>
-            </a:r>
-            <a:r>
-              <a:rPr lang="en-US" sz="2400" dirty="0">
-                <a:latin typeface="Proxima Nova"/>
-                <a:sym typeface="Proxima Nova"/>
-              </a:rPr>
-              <a:t> some structured exercise like key practice, word practice.</a:t>
-            </a:r>
-          </a:p>
-          <a:p>
-            <a:pPr algn="just"/>
-            <a:endParaRPr lang="en-US" sz="2400" dirty="0">
-              <a:latin typeface="Proxima Nova"/>
-              <a:sym typeface="Proxima Nova"/>
-            </a:endParaRPr>
-          </a:p>
-          <a:p>
-            <a:pPr algn="just"/>
-            <a:r>
-              <a:rPr lang="en-US" sz="2400" b="1" dirty="0">
-                <a:latin typeface="Proxima Nova"/>
-                <a:sym typeface="Proxima Nova"/>
-              </a:rPr>
-              <a:t>Typing Game </a:t>
-            </a:r>
-            <a:r>
-              <a:rPr lang="en-US" sz="2400" dirty="0">
-                <a:latin typeface="Proxima Nova"/>
-                <a:sym typeface="Proxima Nova"/>
-              </a:rPr>
-              <a:t>feature adds a fun and interesting experience for users to test their accuracy and speed in an exciting game environment.  </a:t>
-            </a:r>
-          </a:p>
-        </p:txBody>
-      </p:sp>
-    </p:spTree>
-    <p:extLst>
-      <p:ext uri="{BB962C8B-B14F-4D97-AF65-F5344CB8AC3E}">
-        <p14:creationId xmlns:p14="http://schemas.microsoft.com/office/powerpoint/2010/main" val="1158789981"/>
-      </p:ext>
-    </p:extLst>
-  </p:cSld>
-  <p:clrMapOvr>
-    <a:masterClrMapping/>
-  </p:clrMapOvr>
-</p:sld>
-</file>
-
-<file path=ppt/slides/slide3.xml><?xml version="1.0" encoding="utf-8"?>
-<p:sld xmlns:a="http://schemas.openxmlformats.org/drawingml/2006/main" xmlns:r="http://schemas.openxmlformats.org/officeDocument/2006/relationships" xmlns:p="http://schemas.openxmlformats.org/presentationml/2006/main">
-  <p:cSld>
-    <p:spTree>
-      <p:nvGrpSpPr>
-        <p:cNvPr id="1" name=""/>
-        <p:cNvGrpSpPr/>
-        <p:nvPr/>
-      </p:nvGrpSpPr>
-      <p:grpSpPr>
-        <a:xfrm>
-          <a:off x="0" y="0"/>
-          <a:ext cx="0" cy="0"/>
-          <a:chOff x="0" y="0"/>
-          <a:chExt cx="0" cy="0"/>
-        </a:xfrm>
-      </p:grpSpPr>
-      <p:sp>
-        <p:nvSpPr>
-          <p:cNvPr id="2" name="TextBox 1">
-            <a:extLst>
-              <a:ext uri="{FF2B5EF4-FFF2-40B4-BE49-F238E27FC236}">
-                <a16:creationId xmlns:a16="http://schemas.microsoft.com/office/drawing/2014/main" id="{60206AAC-4EB6-4BA1-BA4C-831B5A2952EF}"/>
-              </a:ext>
-            </a:extLst>
-          </p:cNvPr>
-          <p:cNvSpPr txBox="1"/>
-          <p:nvPr/>
-        </p:nvSpPr>
-        <p:spPr>
-          <a:xfrm>
-            <a:off x="1166192" y="1249400"/>
-            <a:ext cx="3803373" cy="3293209"/>
-          </a:xfrm>
-          <a:prstGeom prst="rect">
-            <a:avLst/>
-          </a:prstGeom>
-          <a:noFill/>
-        </p:spPr>
-        <p:txBody>
-          <a:bodyPr wrap="square" rtlCol="0">
-            <a:spAutoFit/>
-          </a:bodyPr>
-          <a:lstStyle/>
-          <a:p>
-            <a:pPr algn="just"/>
-            <a:r>
-              <a:rPr lang="en" sz="5200" b="1" dirty="0"/>
-              <a:t>The Problems and Challenges</a:t>
-            </a:r>
-            <a:endParaRPr lang="en-US" sz="5200" dirty="0"/>
-          </a:p>
-        </p:txBody>
-      </p:sp>
-      <p:sp>
-        <p:nvSpPr>
-          <p:cNvPr id="4" name="TextBox 3">
-            <a:extLst>
-              <a:ext uri="{FF2B5EF4-FFF2-40B4-BE49-F238E27FC236}">
-                <a16:creationId xmlns:a16="http://schemas.microsoft.com/office/drawing/2014/main" id="{028833E6-1DD8-43DE-979F-7B34E83E37DF}"/>
-              </a:ext>
-            </a:extLst>
-          </p:cNvPr>
-          <p:cNvSpPr txBox="1"/>
-          <p:nvPr/>
-        </p:nvSpPr>
-        <p:spPr>
-          <a:xfrm>
-            <a:off x="5357190" y="889843"/>
-            <a:ext cx="6182140" cy="5078313"/>
-          </a:xfrm>
-          <a:prstGeom prst="rect">
-            <a:avLst/>
-          </a:prstGeom>
-          <a:noFill/>
-        </p:spPr>
-        <p:txBody>
-          <a:bodyPr wrap="square" rtlCol="0">
-            <a:spAutoFit/>
-          </a:bodyPr>
-          <a:lstStyle/>
-          <a:p>
-            <a:pPr marL="571500" indent="-571500">
-              <a:buFont typeface="Wingdings" panose="05000000000000000000" pitchFamily="2" charset="2"/>
-              <a:buChar char="q"/>
-            </a:pPr>
-            <a:r>
-              <a:rPr lang="en-US" sz="3600" dirty="0">
-                <a:latin typeface="Consolas" panose="020B0609020204030204" pitchFamily="49" charset="0"/>
-              </a:rPr>
-              <a:t>Register System</a:t>
-            </a:r>
-          </a:p>
-          <a:p>
-            <a:pPr marL="571500" indent="-571500">
-              <a:buFont typeface="Wingdings" panose="05000000000000000000" pitchFamily="2" charset="2"/>
-              <a:buChar char="q"/>
-            </a:pPr>
-            <a:r>
-              <a:rPr lang="en-US" sz="3600" dirty="0">
-                <a:latin typeface="Consolas" panose="020B0609020204030204" pitchFamily="49" charset="0"/>
-              </a:rPr>
-              <a:t>Login System</a:t>
-            </a:r>
-          </a:p>
-          <a:p>
-            <a:pPr marL="571500" indent="-571500">
-              <a:buFont typeface="Wingdings" panose="05000000000000000000" pitchFamily="2" charset="2"/>
-              <a:buChar char="q"/>
-            </a:pPr>
-            <a:r>
-              <a:rPr lang="en-US" sz="3600" dirty="0">
-                <a:latin typeface="Consolas" panose="020B0609020204030204" pitchFamily="49" charset="0"/>
-              </a:rPr>
-              <a:t>Users’ Performance Tracking</a:t>
-            </a:r>
-          </a:p>
-          <a:p>
-            <a:pPr marL="571500" indent="-571500">
-              <a:buFont typeface="Wingdings" panose="05000000000000000000" pitchFamily="2" charset="2"/>
-              <a:buChar char="q"/>
-            </a:pPr>
-            <a:r>
-              <a:rPr lang="en-US" sz="3600" dirty="0">
-                <a:latin typeface="Consolas" panose="020B0609020204030204" pitchFamily="49" charset="0"/>
-              </a:rPr>
-              <a:t>Speed Test</a:t>
-            </a:r>
-          </a:p>
-          <a:p>
-            <a:pPr marL="571500" indent="-571500">
-              <a:buFont typeface="Wingdings" panose="05000000000000000000" pitchFamily="2" charset="2"/>
-              <a:buChar char="q"/>
-            </a:pPr>
-            <a:r>
-              <a:rPr lang="en-US" sz="3600" dirty="0">
-                <a:latin typeface="Consolas" panose="020B0609020204030204" pitchFamily="49" charset="0"/>
-              </a:rPr>
-              <a:t>Accuracy Test</a:t>
-            </a:r>
-          </a:p>
-          <a:p>
-            <a:pPr marL="571500" indent="-571500">
-              <a:buFont typeface="Wingdings" panose="05000000000000000000" pitchFamily="2" charset="2"/>
-              <a:buChar char="q"/>
-            </a:pPr>
-            <a:r>
-              <a:rPr lang="en-US" sz="3600" dirty="0">
-                <a:latin typeface="Consolas" panose="020B0609020204030204" pitchFamily="49" charset="0"/>
-              </a:rPr>
-              <a:t>Game Development</a:t>
-            </a:r>
-          </a:p>
-          <a:p>
-            <a:pPr marL="571500" indent="-571500">
-              <a:buFont typeface="Wingdings" panose="05000000000000000000" pitchFamily="2" charset="2"/>
-              <a:buChar char="q"/>
-            </a:pPr>
-            <a:r>
-              <a:rPr lang="en-US" sz="3600" dirty="0">
-                <a:latin typeface="Consolas" panose="020B0609020204030204" pitchFamily="49" charset="0"/>
-              </a:rPr>
-              <a:t>Performance Analysis</a:t>
-            </a:r>
-          </a:p>
-          <a:p>
-            <a:pPr marL="571500" indent="-571500">
-              <a:buFont typeface="Wingdings" panose="05000000000000000000" pitchFamily="2" charset="2"/>
-              <a:buChar char="q"/>
-            </a:pPr>
-            <a:r>
-              <a:rPr lang="en-US" sz="3600" dirty="0">
-                <a:latin typeface="Consolas" panose="020B0609020204030204" pitchFamily="49" charset="0"/>
-              </a:rPr>
-              <a:t>Regression Modeling </a:t>
-            </a:r>
-          </a:p>
-        </p:txBody>
-      </p:sp>
-    </p:spTree>
-    <p:extLst>
-      <p:ext uri="{BB962C8B-B14F-4D97-AF65-F5344CB8AC3E}">
-        <p14:creationId xmlns:p14="http://schemas.microsoft.com/office/powerpoint/2010/main" val="878249981"/>
-      </p:ext>
-    </p:extLst>
-  </p:cSld>
-  <p:clrMapOvr>
-    <a:masterClrMapping/>
-  </p:clrMapOvr>
-</p:sld>
-</file>
-
-<file path=ppt/slides/slide4.xml><?xml version="1.0" encoding="utf-8"?>
-<p:sld xmlns:a="http://schemas.openxmlformats.org/drawingml/2006/main" xmlns:r="http://schemas.openxmlformats.org/officeDocument/2006/relationships" xmlns:p="http://schemas.openxmlformats.org/presentationml/2006/main">
-  <p:cSld>
-    <p:spTree>
-      <p:nvGrpSpPr>
-        <p:cNvPr id="1" name=""/>
-        <p:cNvGrpSpPr/>
-        <p:nvPr/>
-      </p:nvGrpSpPr>
-      <p:grpSpPr>
-        <a:xfrm>
-          <a:off x="0" y="0"/>
-          <a:ext cx="0" cy="0"/>
-          <a:chOff x="0" y="0"/>
-          <a:chExt cx="0" cy="0"/>
-        </a:xfrm>
-      </p:grpSpPr>
-      <p:sp>
-        <p:nvSpPr>
-          <p:cNvPr id="2" name="Title 1">
-            <a:extLst>
-              <a:ext uri="{FF2B5EF4-FFF2-40B4-BE49-F238E27FC236}">
-                <a16:creationId xmlns:a16="http://schemas.microsoft.com/office/drawing/2014/main" id="{FABF9B43-A57D-48A7-972D-AC5B15210305}"/>
-              </a:ext>
-            </a:extLst>
-          </p:cNvPr>
-          <p:cNvSpPr>
-            <a:spLocks noGrp="1"/>
-          </p:cNvSpPr>
-          <p:nvPr>
-            <p:ph type="title" idx="4294967295"/>
-          </p:nvPr>
-        </p:nvSpPr>
-        <p:spPr>
-          <a:xfrm>
-            <a:off x="1389063" y="2757488"/>
-            <a:ext cx="7958137" cy="1077912"/>
-          </a:xfrm>
-        </p:spPr>
-        <p:txBody>
-          <a:bodyPr>
-            <a:normAutofit fontScale="90000"/>
-          </a:bodyPr>
-          <a:lstStyle/>
-          <a:p>
-            <a:pPr algn="just"/>
-            <a:r>
-              <a:rPr lang="en-US" sz="7200" dirty="0">
-                <a:latin typeface="Arial Rounded MT Bold" panose="020F0704030504030204" pitchFamily="34" charset="0"/>
-              </a:rPr>
-              <a:t>Progress till today</a:t>
-            </a:r>
-          </a:p>
-        </p:txBody>
-      </p:sp>
-    </p:spTree>
-    <p:extLst>
-      <p:ext uri="{BB962C8B-B14F-4D97-AF65-F5344CB8AC3E}">
-        <p14:creationId xmlns:p14="http://schemas.microsoft.com/office/powerpoint/2010/main" val="3175346536"/>
-      </p:ext>
-    </p:extLst>
-  </p:cSld>
-  <p:clrMapOvr>
-    <a:masterClrMapping/>
-  </p:clrMapOvr>
-</p:sld>
-</file>
-
-<file path=ppt/slides/slide5.xml><?xml version="1.0" encoding="utf-8"?>
-<p:sld xmlns:a="http://schemas.openxmlformats.org/drawingml/2006/main" xmlns:r="http://schemas.openxmlformats.org/officeDocument/2006/relationships" xmlns:p="http://schemas.openxmlformats.org/presentationml/2006/main">
-  <p:cSld>
-    <p:spTree>
-      <p:nvGrpSpPr>
-        <p:cNvPr id="1" name=""/>
-        <p:cNvGrpSpPr/>
-        <p:nvPr/>
-      </p:nvGrpSpPr>
-      <p:grpSpPr>
-        <a:xfrm>
-          <a:off x="0" y="0"/>
-          <a:ext cx="0" cy="0"/>
-          <a:chOff x="0" y="0"/>
-          <a:chExt cx="0" cy="0"/>
-        </a:xfrm>
-      </p:grpSpPr>
-      <p:sp>
-        <p:nvSpPr>
-          <p:cNvPr id="3" name="TextBox 2">
-            <a:extLst>
-              <a:ext uri="{FF2B5EF4-FFF2-40B4-BE49-F238E27FC236}">
-                <a16:creationId xmlns:a16="http://schemas.microsoft.com/office/drawing/2014/main" id="{F3E6AD8F-F9DA-4DD5-8FB7-9241E7E5C3E9}"/>
-              </a:ext>
-            </a:extLst>
-          </p:cNvPr>
-          <p:cNvSpPr txBox="1"/>
-          <p:nvPr/>
-        </p:nvSpPr>
-        <p:spPr>
-          <a:xfrm>
-            <a:off x="1292087" y="467140"/>
-            <a:ext cx="6559826" cy="769441"/>
-          </a:xfrm>
-          <a:prstGeom prst="rect">
-            <a:avLst/>
-          </a:prstGeom>
-          <a:noFill/>
-        </p:spPr>
-        <p:txBody>
-          <a:bodyPr wrap="square" rtlCol="0">
-            <a:spAutoFit/>
-          </a:bodyPr>
-          <a:lstStyle/>
-          <a:p>
-            <a:r>
-              <a:rPr lang="en-US" sz="4400" b="1" dirty="0">
-                <a:latin typeface="Consolas" panose="020B0609020204030204" pitchFamily="49" charset="0"/>
-              </a:rPr>
-              <a:t>Main Menu</a:t>
-            </a:r>
-          </a:p>
-        </p:txBody>
-      </p:sp>
-      <p:pic>
-        <p:nvPicPr>
-          <p:cNvPr id="7" name="Picture 6">
-            <a:extLst>
-              <a:ext uri="{FF2B5EF4-FFF2-40B4-BE49-F238E27FC236}">
-                <a16:creationId xmlns:a16="http://schemas.microsoft.com/office/drawing/2014/main" id="{D6299993-65BB-4197-93AD-DD9F72F43FE3}"/>
-              </a:ext>
-            </a:extLst>
-          </p:cNvPr>
-          <p:cNvPicPr>
-            <a:picLocks noChangeAspect="1"/>
-          </p:cNvPicPr>
-          <p:nvPr/>
-        </p:nvPicPr>
-        <p:blipFill>
-          <a:blip r:embed="rId2"/>
-          <a:stretch>
-            <a:fillRect/>
-          </a:stretch>
-        </p:blipFill>
-        <p:spPr>
-          <a:xfrm>
-            <a:off x="6629400" y="725557"/>
-            <a:ext cx="5348464" cy="5574683"/>
-          </a:xfrm>
-          <a:prstGeom prst="rect">
-            <a:avLst/>
-          </a:prstGeom>
-        </p:spPr>
-      </p:pic>
-      <p:sp>
-        <p:nvSpPr>
-          <p:cNvPr id="8" name="TextBox 7">
-            <a:extLst>
-              <a:ext uri="{FF2B5EF4-FFF2-40B4-BE49-F238E27FC236}">
-                <a16:creationId xmlns:a16="http://schemas.microsoft.com/office/drawing/2014/main" id="{EEDEC3E3-6E26-4C59-AA10-C8EB32928B40}"/>
-              </a:ext>
-            </a:extLst>
-          </p:cNvPr>
-          <p:cNvSpPr txBox="1"/>
-          <p:nvPr/>
-        </p:nvSpPr>
-        <p:spPr>
-          <a:xfrm>
-            <a:off x="1292087" y="1858397"/>
-            <a:ext cx="4969565" cy="954107"/>
-          </a:xfrm>
-          <a:prstGeom prst="rect">
-            <a:avLst/>
-          </a:prstGeom>
-          <a:noFill/>
-        </p:spPr>
-        <p:txBody>
-          <a:bodyPr wrap="square" rtlCol="0">
-            <a:spAutoFit/>
-          </a:bodyPr>
-          <a:lstStyle/>
-          <a:p>
-            <a:r>
-              <a:rPr lang="en-US" sz="2800" dirty="0">
-                <a:latin typeface="Bahnschrift SemiBold" panose="020B0502040204020203" pitchFamily="34" charset="0"/>
-              </a:rPr>
-              <a:t>Users can select their desired part. </a:t>
-            </a:r>
-          </a:p>
-        </p:txBody>
-      </p:sp>
-    </p:spTree>
-    <p:extLst>
-      <p:ext uri="{BB962C8B-B14F-4D97-AF65-F5344CB8AC3E}">
-        <p14:creationId xmlns:p14="http://schemas.microsoft.com/office/powerpoint/2010/main" val="301851867"/>
-      </p:ext>
-    </p:extLst>
-  </p:cSld>
-  <p:clrMapOvr>
-    <a:masterClrMapping/>
-  </p:clrMapOvr>
-</p:sld>
-</file>
-
-<file path=ppt/slides/slide6.xml><?xml version="1.0" encoding="utf-8"?>
-<p:sld xmlns:a="http://schemas.openxmlformats.org/drawingml/2006/main" xmlns:r="http://schemas.openxmlformats.org/officeDocument/2006/relationships" xmlns:p="http://schemas.openxmlformats.org/presentationml/2006/main">
-  <p:cSld>
-    <p:spTree>
-      <p:nvGrpSpPr>
-        <p:cNvPr id="1" name=""/>
-        <p:cNvGrpSpPr/>
-        <p:nvPr/>
-      </p:nvGrpSpPr>
-      <p:grpSpPr>
-        <a:xfrm>
-          <a:off x="0" y="0"/>
-          <a:ext cx="0" cy="0"/>
-          <a:chOff x="0" y="0"/>
-          <a:chExt cx="0" cy="0"/>
-        </a:xfrm>
-      </p:grpSpPr>
-      <p:sp>
-        <p:nvSpPr>
-          <p:cNvPr id="2" name="TextBox 1">
-            <a:extLst>
-              <a:ext uri="{FF2B5EF4-FFF2-40B4-BE49-F238E27FC236}">
-                <a16:creationId xmlns:a16="http://schemas.microsoft.com/office/drawing/2014/main" id="{35C40C1A-BD3F-4459-BD9A-077147F1EA66}"/>
-              </a:ext>
-            </a:extLst>
-          </p:cNvPr>
-          <p:cNvSpPr txBox="1"/>
-          <p:nvPr/>
-        </p:nvSpPr>
-        <p:spPr>
-          <a:xfrm>
-            <a:off x="1212574" y="464504"/>
-            <a:ext cx="5377069" cy="707886"/>
-          </a:xfrm>
-          <a:prstGeom prst="rect">
-            <a:avLst/>
-          </a:prstGeom>
-          <a:noFill/>
-        </p:spPr>
-        <p:txBody>
-          <a:bodyPr wrap="square" rtlCol="0">
-            <a:spAutoFit/>
-          </a:bodyPr>
-          <a:lstStyle/>
-          <a:p>
-            <a:r>
-              <a:rPr lang="en-US" sz="4000" b="1" dirty="0">
-                <a:latin typeface="Consolas" panose="020B0609020204030204" pitchFamily="49" charset="0"/>
-              </a:rPr>
-              <a:t>Typing Tutorial</a:t>
-            </a:r>
-          </a:p>
-        </p:txBody>
-      </p:sp>
-      <p:pic>
-        <p:nvPicPr>
-          <p:cNvPr id="6" name="Picture 5">
-            <a:extLst>
-              <a:ext uri="{FF2B5EF4-FFF2-40B4-BE49-F238E27FC236}">
-                <a16:creationId xmlns:a16="http://schemas.microsoft.com/office/drawing/2014/main" id="{C6EB2D00-B4CD-4108-B83C-5B84C5BDCC49}"/>
-              </a:ext>
-            </a:extLst>
-          </p:cNvPr>
-          <p:cNvPicPr>
-            <a:picLocks noChangeAspect="1"/>
-          </p:cNvPicPr>
-          <p:nvPr/>
-        </p:nvPicPr>
-        <p:blipFill>
-          <a:blip r:embed="rId2"/>
-          <a:stretch>
-            <a:fillRect/>
-          </a:stretch>
-        </p:blipFill>
-        <p:spPr>
-          <a:xfrm>
-            <a:off x="6127774" y="1075633"/>
-            <a:ext cx="5848877" cy="5116445"/>
-          </a:xfrm>
-          <a:prstGeom prst="rect">
-            <a:avLst/>
-          </a:prstGeom>
-        </p:spPr>
-      </p:pic>
-      <p:sp>
-        <p:nvSpPr>
-          <p:cNvPr id="7" name="TextBox 6">
-            <a:extLst>
-              <a:ext uri="{FF2B5EF4-FFF2-40B4-BE49-F238E27FC236}">
-                <a16:creationId xmlns:a16="http://schemas.microsoft.com/office/drawing/2014/main" id="{1D841475-1A0A-41A8-A542-9C66DC7FEC92}"/>
-              </a:ext>
-            </a:extLst>
-          </p:cNvPr>
-          <p:cNvSpPr txBox="1"/>
-          <p:nvPr/>
-        </p:nvSpPr>
-        <p:spPr>
-          <a:xfrm>
-            <a:off x="1212574" y="1397337"/>
-            <a:ext cx="4572000" cy="4893647"/>
-          </a:xfrm>
-          <a:prstGeom prst="rect">
-            <a:avLst/>
-          </a:prstGeom>
-          <a:noFill/>
-        </p:spPr>
-        <p:txBody>
-          <a:bodyPr wrap="square" rtlCol="0">
-            <a:spAutoFit/>
-          </a:bodyPr>
-          <a:lstStyle/>
-          <a:p>
-            <a:r>
-              <a:rPr lang="en-US" sz="2600" dirty="0">
-                <a:latin typeface="Bahnschrift SemiBold" panose="020B0502040204020203" pitchFamily="34" charset="0"/>
-                <a:ea typeface="Cascadia Code" panose="020B0609020000020004" pitchFamily="49" charset="0"/>
-                <a:cs typeface="Cascadia Code" panose="020B0609020000020004" pitchFamily="49" charset="0"/>
-              </a:rPr>
-              <a:t>To give a good learning experience, typing tutorial part is divided into 6 part. All the keys (a to z) have been classified into 5 lesson depending on the preferred finger for type the key. Thus user can easily  remember the key rhythm. Lastly a feature added which provides some common words to practice.</a:t>
-            </a:r>
-          </a:p>
-        </p:txBody>
-      </p:sp>
-    </p:spTree>
-    <p:extLst>
-      <p:ext uri="{BB962C8B-B14F-4D97-AF65-F5344CB8AC3E}">
-        <p14:creationId xmlns:p14="http://schemas.microsoft.com/office/powerpoint/2010/main" val="705995340"/>
-      </p:ext>
-    </p:extLst>
-  </p:cSld>
-  <p:clrMapOvr>
-    <a:masterClrMapping/>
-  </p:clrMapOvr>
-</p:sld>
-</file>
-
-<file path=ppt/slides/slide7.xml><?xml version="1.0" encoding="utf-8"?>
-<p:sld xmlns:a="http://schemas.openxmlformats.org/drawingml/2006/main" xmlns:r="http://schemas.openxmlformats.org/officeDocument/2006/relationships" xmlns:p="http://schemas.openxmlformats.org/presentationml/2006/main">
-  <p:cSld>
-    <p:spTree>
-      <p:nvGrpSpPr>
-        <p:cNvPr id="1" name=""/>
-        <p:cNvGrpSpPr/>
-        <p:nvPr/>
-      </p:nvGrpSpPr>
-      <p:grpSpPr>
-        <a:xfrm>
-          <a:off x="0" y="0"/>
-          <a:ext cx="0" cy="0"/>
-          <a:chOff x="0" y="0"/>
-          <a:chExt cx="0" cy="0"/>
-        </a:xfrm>
-      </p:grpSpPr>
-      <p:sp>
-        <p:nvSpPr>
-          <p:cNvPr id="2" name="TextBox 1">
-            <a:extLst>
-              <a:ext uri="{FF2B5EF4-FFF2-40B4-BE49-F238E27FC236}">
-                <a16:creationId xmlns:a16="http://schemas.microsoft.com/office/drawing/2014/main" id="{FC845461-E331-4685-A6A3-630F91C40F9C}"/>
-              </a:ext>
-            </a:extLst>
-          </p:cNvPr>
-          <p:cNvSpPr txBox="1"/>
-          <p:nvPr/>
-        </p:nvSpPr>
-        <p:spPr>
-          <a:xfrm>
-            <a:off x="1046922" y="327327"/>
-            <a:ext cx="5049078" cy="1446550"/>
-          </a:xfrm>
-          <a:prstGeom prst="rect">
-            <a:avLst/>
-          </a:prstGeom>
-          <a:noFill/>
-        </p:spPr>
-        <p:txBody>
-          <a:bodyPr wrap="square" rtlCol="0">
-            <a:spAutoFit/>
-          </a:bodyPr>
-          <a:lstStyle/>
-          <a:p>
-            <a:r>
-              <a:rPr lang="en-US" sz="4400" b="1" dirty="0">
-                <a:latin typeface="Consolas" panose="020B0609020204030204" pitchFamily="49" charset="0"/>
-              </a:rPr>
-              <a:t>Feature in each Lesson</a:t>
-            </a:r>
-          </a:p>
-        </p:txBody>
-      </p:sp>
-      <p:pic>
-        <p:nvPicPr>
-          <p:cNvPr id="6" name="Picture 5">
-            <a:extLst>
-              <a:ext uri="{FF2B5EF4-FFF2-40B4-BE49-F238E27FC236}">
-                <a16:creationId xmlns:a16="http://schemas.microsoft.com/office/drawing/2014/main" id="{4047FE4B-90CD-48D6-951C-DD6E65C17A9D}"/>
-              </a:ext>
-            </a:extLst>
-          </p:cNvPr>
-          <p:cNvPicPr>
-            <a:picLocks noChangeAspect="1"/>
-          </p:cNvPicPr>
-          <p:nvPr/>
-        </p:nvPicPr>
-        <p:blipFill>
-          <a:blip r:embed="rId2"/>
-          <a:stretch>
-            <a:fillRect/>
-          </a:stretch>
-        </p:blipFill>
-        <p:spPr>
-          <a:xfrm>
-            <a:off x="6096000" y="2167780"/>
-            <a:ext cx="5936494" cy="2522439"/>
-          </a:xfrm>
-          <a:prstGeom prst="rect">
-            <a:avLst/>
-          </a:prstGeom>
-        </p:spPr>
-      </p:pic>
-      <p:sp>
-        <p:nvSpPr>
-          <p:cNvPr id="7" name="TextBox 6">
-            <a:extLst>
-              <a:ext uri="{FF2B5EF4-FFF2-40B4-BE49-F238E27FC236}">
-                <a16:creationId xmlns:a16="http://schemas.microsoft.com/office/drawing/2014/main" id="{F7C1FE18-185D-4410-8941-3E39CD9B6F8B}"/>
-              </a:ext>
-            </a:extLst>
-          </p:cNvPr>
-          <p:cNvSpPr txBox="1"/>
-          <p:nvPr/>
-        </p:nvSpPr>
-        <p:spPr>
-          <a:xfrm>
-            <a:off x="1192696" y="2067339"/>
-            <a:ext cx="4591878" cy="4801314"/>
-          </a:xfrm>
-          <a:prstGeom prst="rect">
-            <a:avLst/>
-          </a:prstGeom>
-          <a:noFill/>
-        </p:spPr>
-        <p:txBody>
-          <a:bodyPr wrap="square" rtlCol="0">
-            <a:spAutoFit/>
-          </a:bodyPr>
-          <a:lstStyle/>
-          <a:p>
-            <a:r>
-              <a:rPr lang="en-US" sz="2200" dirty="0">
-                <a:latin typeface="Bahnschrift SemiBold" panose="020B0502040204020203" pitchFamily="34" charset="0"/>
-              </a:rPr>
-              <a:t>Each Lesson provides 3 major features.</a:t>
-            </a:r>
-          </a:p>
-          <a:p>
-            <a:endParaRPr lang="en-US" sz="2200" dirty="0">
-              <a:latin typeface="Bahnschrift SemiBold" panose="020B0502040204020203" pitchFamily="34" charset="0"/>
-            </a:endParaRPr>
-          </a:p>
-          <a:p>
-            <a:r>
-              <a:rPr lang="en-US" sz="2200" dirty="0">
-                <a:latin typeface="Bahnschrift SemiBold" panose="020B0502040204020203" pitchFamily="34" charset="0"/>
-              </a:rPr>
-              <a:t>User can get interactive techniques of typing like proper finger placement, hand positioning, typing posture </a:t>
-            </a:r>
-            <a:r>
-              <a:rPr lang="en-US" sz="2200" dirty="0" err="1">
-                <a:latin typeface="Bahnschrift SemiBold" panose="020B0502040204020203" pitchFamily="34" charset="0"/>
-              </a:rPr>
-              <a:t>etc</a:t>
-            </a:r>
-            <a:r>
-              <a:rPr lang="en-US" sz="2200" dirty="0">
-                <a:latin typeface="Bahnschrift SemiBold" panose="020B0502040204020203" pitchFamily="34" charset="0"/>
-              </a:rPr>
-              <a:t> from the review Row part.</a:t>
-            </a:r>
-          </a:p>
-          <a:p>
-            <a:endParaRPr lang="en-US" sz="2200" dirty="0">
-              <a:latin typeface="Bahnschrift SemiBold" panose="020B0502040204020203" pitchFamily="34" charset="0"/>
-            </a:endParaRPr>
-          </a:p>
-          <a:p>
-            <a:r>
-              <a:rPr lang="en-US" sz="2200" dirty="0">
-                <a:latin typeface="Bahnschrift SemiBold" panose="020B0502040204020203" pitchFamily="34" charset="0"/>
-              </a:rPr>
-              <a:t>Users can practice typing through key typing and word typing. All the alphabet and word are totally randomly generated.</a:t>
-            </a:r>
-          </a:p>
-          <a:p>
-            <a:endParaRPr lang="en-US" sz="2000" dirty="0">
-              <a:latin typeface="Bahnschrift SemiBold" panose="020B0502040204020203" pitchFamily="34" charset="0"/>
-            </a:endParaRPr>
-          </a:p>
-        </p:txBody>
-      </p:sp>
-    </p:spTree>
-    <p:extLst>
-      <p:ext uri="{BB962C8B-B14F-4D97-AF65-F5344CB8AC3E}">
-        <p14:creationId xmlns:p14="http://schemas.microsoft.com/office/powerpoint/2010/main" val="2091511458"/>
-      </p:ext>
-    </p:extLst>
-  </p:cSld>
-  <p:clrMapOvr>
-    <a:masterClrMapping/>
-  </p:clrMapOvr>
-</p:sld>
-</file>
-
-<file path=ppt/slides/slide8.xml><?xml version="1.0" encoding="utf-8"?>
-<p:sld xmlns:a="http://schemas.openxmlformats.org/drawingml/2006/main" xmlns:r="http://schemas.openxmlformats.org/officeDocument/2006/relationships" xmlns:p="http://schemas.openxmlformats.org/presentationml/2006/main">
-  <p:cSld>
-    <p:spTree>
-      <p:nvGrpSpPr>
-        <p:cNvPr id="1" name=""/>
-        <p:cNvGrpSpPr/>
-        <p:nvPr/>
-      </p:nvGrpSpPr>
-      <p:grpSpPr>
-        <a:xfrm>
-          <a:off x="0" y="0"/>
-          <a:ext cx="0" cy="0"/>
-          <a:chOff x="0" y="0"/>
-          <a:chExt cx="0" cy="0"/>
-        </a:xfrm>
-      </p:grpSpPr>
       <p:pic>
         <p:nvPicPr>
           <p:cNvPr id="4" name="Picture 3">
@@ -6146,7 +5122,7 @@
         </p:blipFill>
         <p:spPr>
           <a:xfrm>
-            <a:off x="5961644" y="182085"/>
+            <a:off x="6509382" y="157039"/>
             <a:ext cx="5345773" cy="2647321"/>
           </a:xfrm>
           <a:prstGeom prst="rect">
@@ -6205,8 +5181,8 @@
         </p:nvSpPr>
         <p:spPr>
           <a:xfrm>
-            <a:off x="1202635" y="1192696"/>
-            <a:ext cx="4104861" cy="1569660"/>
+            <a:off x="1102324" y="1117861"/>
+            <a:ext cx="4712067" cy="1569660"/>
           </a:xfrm>
           <a:prstGeom prst="rect">
             <a:avLst/>
@@ -6219,6 +5195,10 @@
           </a:bodyPr>
           <a:lstStyle/>
           <a:p>
+            <a:pPr marL="342900" indent="-342900">
+              <a:buFont typeface="Wingdings" panose="05000000000000000000" pitchFamily="2" charset="2"/>
+              <a:buChar char="ü"/>
+            </a:pPr>
             <a:r>
               <a:rPr lang="en-US" sz="2400" dirty="0">
                 <a:latin typeface="Bahnschrift SemiBold" panose="020B0502040204020203" pitchFamily="34" charset="0"/>
@@ -6230,10 +5210,10 @@
       </p:sp>
       <p:pic>
         <p:nvPicPr>
-          <p:cNvPr id="8" name="Picture 7">
+          <p:cNvPr id="3" name="Picture 2">
             <a:extLst>
               <a:ext uri="{FF2B5EF4-FFF2-40B4-BE49-F238E27FC236}">
-                <a16:creationId xmlns:a16="http://schemas.microsoft.com/office/drawing/2014/main" id="{1643E8AF-1BB7-47AB-8704-5A7DFA497120}"/>
+                <a16:creationId xmlns:a16="http://schemas.microsoft.com/office/drawing/2014/main" id="{641FD605-C6CB-467F-9443-1352A54D22E9}"/>
               </a:ext>
             </a:extLst>
           </p:cNvPr>
@@ -6250,8 +5230,8 @@
         </p:blipFill>
         <p:spPr>
           <a:xfrm>
-            <a:off x="525855" y="3046126"/>
-            <a:ext cx="5332943" cy="3544703"/>
+            <a:off x="414132" y="2922665"/>
+            <a:ext cx="4970314" cy="3747872"/>
           </a:xfrm>
           <a:prstGeom prst="rect">
             <a:avLst/>
@@ -6260,10 +5240,10 @@
       </p:pic>
       <p:pic>
         <p:nvPicPr>
-          <p:cNvPr id="10" name="Picture 9">
+          <p:cNvPr id="7" name="Picture 6">
             <a:extLst>
               <a:ext uri="{FF2B5EF4-FFF2-40B4-BE49-F238E27FC236}">
-                <a16:creationId xmlns:a16="http://schemas.microsoft.com/office/drawing/2014/main" id="{5AEF33F2-6917-4F28-ABB1-689064FA2FB5}"/>
+                <a16:creationId xmlns:a16="http://schemas.microsoft.com/office/drawing/2014/main" id="{3006E754-DED0-49BD-9C1A-21A7BE2120BC}"/>
               </a:ext>
             </a:extLst>
           </p:cNvPr>
@@ -6280,8 +5260,8 @@
         </p:blipFill>
         <p:spPr>
           <a:xfrm>
-            <a:off x="6832115" y="3046126"/>
-            <a:ext cx="4737031" cy="3629789"/>
+            <a:off x="6115130" y="2958467"/>
+            <a:ext cx="5620898" cy="3742494"/>
           </a:xfrm>
           <a:prstGeom prst="rect">
             <a:avLst/>
@@ -6301,7 +5281,7 @@
 </p:sld>
 </file>
 
-<file path=ppt/slides/slide9.xml><?xml version="1.0" encoding="utf-8"?>
+<file path=ppt/slides/slide11.xml><?xml version="1.0" encoding="utf-8"?>
 <p:sld xmlns:a="http://schemas.openxmlformats.org/drawingml/2006/main" xmlns:r="http://schemas.openxmlformats.org/officeDocument/2006/relationships" xmlns:p="http://schemas.openxmlformats.org/presentationml/2006/main">
   <p:cSld>
     <p:spTree>
@@ -6340,8 +5320,8 @@
         </p:blipFill>
         <p:spPr>
           <a:xfrm>
-            <a:off x="6096000" y="1163563"/>
-            <a:ext cx="5870250" cy="5206355"/>
+            <a:off x="4303643" y="1349856"/>
+            <a:ext cx="7563216" cy="5206355"/>
           </a:xfrm>
           <a:prstGeom prst="rect">
             <a:avLst/>
@@ -6363,7 +5343,7 @@
         <p:spPr>
           <a:xfrm>
             <a:off x="1143000" y="301789"/>
-            <a:ext cx="4860235" cy="861774"/>
+            <a:ext cx="7832035" cy="1077218"/>
           </a:xfrm>
           <a:prstGeom prst="rect">
             <a:avLst/>
@@ -6377,14 +5357,14 @@
           <a:lstStyle/>
           <a:p>
             <a:r>
-              <a:rPr lang="en-US" sz="3200" b="1" dirty="0">
+              <a:rPr lang="en-US" sz="4000" b="1" dirty="0">
                 <a:latin typeface="Consolas" panose="020B0609020204030204" pitchFamily="49" charset="0"/>
               </a:rPr>
               <a:t>Performance Result</a:t>
             </a:r>
           </a:p>
           <a:p>
-            <a:endParaRPr lang="en-US" dirty="0"/>
+            <a:endParaRPr lang="en-US" sz="2400" dirty="0"/>
           </a:p>
         </p:txBody>
       </p:sp>
@@ -6402,8 +5382,8 @@
         </p:nvSpPr>
         <p:spPr>
           <a:xfrm>
-            <a:off x="1143000" y="1163563"/>
-            <a:ext cx="4731026" cy="5447645"/>
+            <a:off x="964095" y="1163563"/>
+            <a:ext cx="3548270" cy="4770537"/>
           </a:xfrm>
           <a:prstGeom prst="rect">
             <a:avLst/>
@@ -6415,14 +5395,6 @@
             <a:spAutoFit/>
           </a:bodyPr>
           <a:lstStyle/>
-          <a:p>
-            <a:r>
-              <a:rPr lang="en-US" sz="2200" dirty="0">
-                <a:latin typeface="Bahnschrift SemiBold" panose="020B0502040204020203" pitchFamily="34" charset="0"/>
-              </a:rPr>
-              <a:t>Based on the users performance some analysis will be given. </a:t>
-            </a:r>
-          </a:p>
           <a:p>
             <a:endParaRPr lang="en-US" sz="2200" dirty="0">
               <a:latin typeface="Bahnschrift SemiBold" panose="020B0502040204020203" pitchFamily="34" charset="0"/>
@@ -6542,6 +5514,2417 @@
     <p:extLst>
       <p:ext uri="{BB962C8B-B14F-4D97-AF65-F5344CB8AC3E}">
         <p14:creationId xmlns:p14="http://schemas.microsoft.com/office/powerpoint/2010/main" val="3481686143"/>
+      </p:ext>
+    </p:extLst>
+  </p:cSld>
+  <p:clrMapOvr>
+    <a:masterClrMapping/>
+  </p:clrMapOvr>
+</p:sld>
+</file>
+
+<file path=ppt/slides/slide12.xml><?xml version="1.0" encoding="utf-8"?>
+<p:sld xmlns:a="http://schemas.openxmlformats.org/drawingml/2006/main" xmlns:r="http://schemas.openxmlformats.org/officeDocument/2006/relationships" xmlns:p="http://schemas.openxmlformats.org/presentationml/2006/main">
+  <p:cSld>
+    <p:spTree>
+      <p:nvGrpSpPr>
+        <p:cNvPr id="1" name=""/>
+        <p:cNvGrpSpPr/>
+        <p:nvPr/>
+      </p:nvGrpSpPr>
+      <p:grpSpPr>
+        <a:xfrm>
+          <a:off x="0" y="0"/>
+          <a:ext cx="0" cy="0"/>
+          <a:chOff x="0" y="0"/>
+          <a:chExt cx="0" cy="0"/>
+        </a:xfrm>
+      </p:grpSpPr>
+      <p:sp>
+        <p:nvSpPr>
+          <p:cNvPr id="2" name="TextBox 1">
+            <a:extLst>
+              <a:ext uri="{FF2B5EF4-FFF2-40B4-BE49-F238E27FC236}">
+                <a16:creationId xmlns:a16="http://schemas.microsoft.com/office/drawing/2014/main" id="{A18B765C-7C33-497C-8A3C-A12FF7958380}"/>
+              </a:ext>
+            </a:extLst>
+          </p:cNvPr>
+          <p:cNvSpPr txBox="1"/>
+          <p:nvPr/>
+        </p:nvSpPr>
+        <p:spPr>
+          <a:xfrm>
+            <a:off x="1818860" y="327992"/>
+            <a:ext cx="7444409" cy="584775"/>
+          </a:xfrm>
+          <a:prstGeom prst="rect">
+            <a:avLst/>
+          </a:prstGeom>
+          <a:noFill/>
+        </p:spPr>
+        <p:txBody>
+          <a:bodyPr wrap="square" rtlCol="0">
+            <a:spAutoFit/>
+          </a:bodyPr>
+          <a:lstStyle/>
+          <a:p>
+            <a:r>
+              <a:rPr lang="en-US" sz="3200" dirty="0">
+                <a:latin typeface="Consolas" panose="020B0609020204030204" pitchFamily="49" charset="0"/>
+              </a:rPr>
+              <a:t>Statistics: Performance History</a:t>
+            </a:r>
+          </a:p>
+        </p:txBody>
+      </p:sp>
+      <p:sp>
+        <p:nvSpPr>
+          <p:cNvPr id="9" name="TextBox 8">
+            <a:extLst>
+              <a:ext uri="{FF2B5EF4-FFF2-40B4-BE49-F238E27FC236}">
+                <a16:creationId xmlns:a16="http://schemas.microsoft.com/office/drawing/2014/main" id="{413CAD0D-6EE8-41AD-94A2-38D61A4D2DAD}"/>
+              </a:ext>
+            </a:extLst>
+          </p:cNvPr>
+          <p:cNvSpPr txBox="1"/>
+          <p:nvPr/>
+        </p:nvSpPr>
+        <p:spPr>
+          <a:xfrm>
+            <a:off x="1212575" y="5454962"/>
+            <a:ext cx="9044609" cy="830997"/>
+          </a:xfrm>
+          <a:prstGeom prst="rect">
+            <a:avLst/>
+          </a:prstGeom>
+          <a:noFill/>
+        </p:spPr>
+        <p:txBody>
+          <a:bodyPr wrap="square" rtlCol="0">
+            <a:spAutoFit/>
+          </a:bodyPr>
+          <a:lstStyle/>
+          <a:p>
+            <a:endParaRPr lang="en-US" sz="2400" dirty="0">
+              <a:latin typeface="Bahnschrift SemiBold" panose="020B0502040204020203" pitchFamily="34" charset="0"/>
+            </a:endParaRPr>
+          </a:p>
+          <a:p>
+            <a:r>
+              <a:rPr lang="en-US" sz="2400" dirty="0">
+                <a:latin typeface="Bahnschrift SemiBold" panose="020B0502040204020203" pitchFamily="34" charset="0"/>
+              </a:rPr>
+              <a:t>Users performance will be stored in a text file. </a:t>
+            </a:r>
+          </a:p>
+        </p:txBody>
+      </p:sp>
+      <p:pic>
+        <p:nvPicPr>
+          <p:cNvPr id="4" name="Picture 3">
+            <a:extLst>
+              <a:ext uri="{FF2B5EF4-FFF2-40B4-BE49-F238E27FC236}">
+                <a16:creationId xmlns:a16="http://schemas.microsoft.com/office/drawing/2014/main" id="{298247A1-89CE-48A8-A300-1B1D3F857CC6}"/>
+              </a:ext>
+            </a:extLst>
+          </p:cNvPr>
+          <p:cNvPicPr>
+            <a:picLocks noChangeAspect="1"/>
+          </p:cNvPicPr>
+          <p:nvPr/>
+        </p:nvPicPr>
+        <p:blipFill>
+          <a:blip r:embed="rId2"/>
+          <a:stretch>
+            <a:fillRect/>
+          </a:stretch>
+        </p:blipFill>
+        <p:spPr>
+          <a:xfrm>
+            <a:off x="800609" y="1191062"/>
+            <a:ext cx="11187129" cy="3985605"/>
+          </a:xfrm>
+          <a:prstGeom prst="rect">
+            <a:avLst/>
+          </a:prstGeom>
+        </p:spPr>
+      </p:pic>
+    </p:spTree>
+    <p:extLst>
+      <p:ext uri="{BB962C8B-B14F-4D97-AF65-F5344CB8AC3E}">
+        <p14:creationId xmlns:p14="http://schemas.microsoft.com/office/powerpoint/2010/main" val="1015052894"/>
+      </p:ext>
+    </p:extLst>
+  </p:cSld>
+  <p:clrMapOvr>
+    <a:masterClrMapping/>
+  </p:clrMapOvr>
+</p:sld>
+</file>
+
+<file path=ppt/slides/slide13.xml><?xml version="1.0" encoding="utf-8"?>
+<p:sld xmlns:a="http://schemas.openxmlformats.org/drawingml/2006/main" xmlns:r="http://schemas.openxmlformats.org/officeDocument/2006/relationships" xmlns:p="http://schemas.openxmlformats.org/presentationml/2006/main">
+  <p:cSld>
+    <p:bg>
+      <p:bgRef idx="1003">
+        <a:schemeClr val="bg1"/>
+      </p:bgRef>
+    </p:bg>
+    <p:spTree>
+      <p:nvGrpSpPr>
+        <p:cNvPr id="1" name=""/>
+        <p:cNvGrpSpPr/>
+        <p:nvPr/>
+      </p:nvGrpSpPr>
+      <p:grpSpPr>
+        <a:xfrm>
+          <a:off x="0" y="0"/>
+          <a:ext cx="0" cy="0"/>
+          <a:chOff x="0" y="0"/>
+          <a:chExt cx="0" cy="0"/>
+        </a:xfrm>
+      </p:grpSpPr>
+      <p:sp>
+        <p:nvSpPr>
+          <p:cNvPr id="2" name="TextBox 1">
+            <a:extLst>
+              <a:ext uri="{FF2B5EF4-FFF2-40B4-BE49-F238E27FC236}">
+                <a16:creationId xmlns:a16="http://schemas.microsoft.com/office/drawing/2014/main" id="{03C14670-BD49-4180-B2C0-88FD39418AE2}"/>
+              </a:ext>
+            </a:extLst>
+          </p:cNvPr>
+          <p:cNvSpPr txBox="1"/>
+          <p:nvPr/>
+        </p:nvSpPr>
+        <p:spPr>
+          <a:xfrm>
+            <a:off x="3011095" y="308402"/>
+            <a:ext cx="7354956" cy="923330"/>
+          </a:xfrm>
+          <a:prstGeom prst="rect">
+            <a:avLst/>
+          </a:prstGeom>
+          <a:noFill/>
+        </p:spPr>
+        <p:txBody>
+          <a:bodyPr wrap="square" rtlCol="0">
+            <a:spAutoFit/>
+          </a:bodyPr>
+          <a:lstStyle/>
+          <a:p>
+            <a:r>
+              <a:rPr lang="en-US" sz="3600" b="1" dirty="0">
+                <a:latin typeface="Consolas" panose="020B0609020204030204" pitchFamily="49" charset="0"/>
+              </a:rPr>
+              <a:t>Game: Fast </a:t>
+            </a:r>
+            <a:r>
+              <a:rPr lang="en-US" sz="3600" b="1" dirty="0" err="1">
+                <a:latin typeface="Consolas" panose="020B0609020204030204" pitchFamily="49" charset="0"/>
+              </a:rPr>
+              <a:t>Typer</a:t>
+            </a:r>
+            <a:endParaRPr lang="en-US" sz="3600" b="1" dirty="0">
+              <a:latin typeface="Consolas" panose="020B0609020204030204" pitchFamily="49" charset="0"/>
+            </a:endParaRPr>
+          </a:p>
+          <a:p>
+            <a:endParaRPr lang="en-US" sz="1600" dirty="0"/>
+          </a:p>
+        </p:txBody>
+      </p:sp>
+      <p:sp>
+        <p:nvSpPr>
+          <p:cNvPr id="3" name="TextBox 2">
+            <a:extLst>
+              <a:ext uri="{FF2B5EF4-FFF2-40B4-BE49-F238E27FC236}">
+                <a16:creationId xmlns:a16="http://schemas.microsoft.com/office/drawing/2014/main" id="{EF96B286-91AD-47C7-B301-B8A6D4A0D34C}"/>
+              </a:ext>
+            </a:extLst>
+          </p:cNvPr>
+          <p:cNvSpPr txBox="1"/>
+          <p:nvPr/>
+        </p:nvSpPr>
+        <p:spPr>
+          <a:xfrm>
+            <a:off x="1013791" y="1054490"/>
+            <a:ext cx="9889435" cy="1815882"/>
+          </a:xfrm>
+          <a:prstGeom prst="rect">
+            <a:avLst/>
+          </a:prstGeom>
+          <a:noFill/>
+        </p:spPr>
+        <p:txBody>
+          <a:bodyPr wrap="square" rtlCol="0">
+            <a:spAutoFit/>
+          </a:bodyPr>
+          <a:lstStyle/>
+          <a:p>
+            <a:pPr marL="457200" indent="-457200">
+              <a:buFont typeface="Wingdings" panose="05000000000000000000" pitchFamily="2" charset="2"/>
+              <a:buChar char="ü"/>
+            </a:pPr>
+            <a:r>
+              <a:rPr lang="en-US" sz="2800" dirty="0"/>
+              <a:t>user will play for 60 seconds to type word as much as he can.</a:t>
+            </a:r>
+          </a:p>
+          <a:p>
+            <a:pPr marL="457200" indent="-457200">
+              <a:buFont typeface="Wingdings" panose="05000000000000000000" pitchFamily="2" charset="2"/>
+              <a:buChar char="ü"/>
+            </a:pPr>
+            <a:r>
+              <a:rPr lang="en-US" sz="2800" dirty="0"/>
+              <a:t>Highest score will be saved.</a:t>
+            </a:r>
+          </a:p>
+          <a:p>
+            <a:pPr marL="457200" indent="-457200">
+              <a:buFont typeface="Wingdings" panose="05000000000000000000" pitchFamily="2" charset="2"/>
+              <a:buChar char="ü"/>
+            </a:pPr>
+            <a:r>
+              <a:rPr lang="en-US" sz="2800" dirty="0"/>
+              <a:t>Words are taken from a text file</a:t>
+            </a:r>
+          </a:p>
+        </p:txBody>
+      </p:sp>
+      <p:pic>
+        <p:nvPicPr>
+          <p:cNvPr id="5" name="Picture 4">
+            <a:extLst>
+              <a:ext uri="{FF2B5EF4-FFF2-40B4-BE49-F238E27FC236}">
+                <a16:creationId xmlns:a16="http://schemas.microsoft.com/office/drawing/2014/main" id="{9C092BDA-C5CD-4A83-A0A0-DF22891E3562}"/>
+              </a:ext>
+            </a:extLst>
+          </p:cNvPr>
+          <p:cNvPicPr>
+            <a:picLocks noChangeAspect="1"/>
+          </p:cNvPicPr>
+          <p:nvPr/>
+        </p:nvPicPr>
+        <p:blipFill>
+          <a:blip r:embed="rId3"/>
+          <a:stretch>
+            <a:fillRect/>
+          </a:stretch>
+        </p:blipFill>
+        <p:spPr>
+          <a:xfrm>
+            <a:off x="430482" y="3080923"/>
+            <a:ext cx="6009767" cy="3557297"/>
+          </a:xfrm>
+          <a:prstGeom prst="rect">
+            <a:avLst/>
+          </a:prstGeom>
+        </p:spPr>
+      </p:pic>
+      <p:pic>
+        <p:nvPicPr>
+          <p:cNvPr id="7" name="Picture 6">
+            <a:extLst>
+              <a:ext uri="{FF2B5EF4-FFF2-40B4-BE49-F238E27FC236}">
+                <a16:creationId xmlns:a16="http://schemas.microsoft.com/office/drawing/2014/main" id="{4233279B-9641-43F3-845E-518B03877B7D}"/>
+              </a:ext>
+            </a:extLst>
+          </p:cNvPr>
+          <p:cNvPicPr>
+            <a:picLocks noChangeAspect="1"/>
+          </p:cNvPicPr>
+          <p:nvPr/>
+        </p:nvPicPr>
+        <p:blipFill>
+          <a:blip r:embed="rId4"/>
+          <a:stretch>
+            <a:fillRect/>
+          </a:stretch>
+        </p:blipFill>
+        <p:spPr>
+          <a:xfrm>
+            <a:off x="6618999" y="3566909"/>
+            <a:ext cx="5353558" cy="3071311"/>
+          </a:xfrm>
+          <a:prstGeom prst="rect">
+            <a:avLst/>
+          </a:prstGeom>
+        </p:spPr>
+      </p:pic>
+    </p:spTree>
+    <p:extLst>
+      <p:ext uri="{BB962C8B-B14F-4D97-AF65-F5344CB8AC3E}">
+        <p14:creationId xmlns:p14="http://schemas.microsoft.com/office/powerpoint/2010/main" val="232859133"/>
+      </p:ext>
+    </p:extLst>
+  </p:cSld>
+  <p:clrMapOvr>
+    <a:overrideClrMapping bg1="dk1" tx1="lt1" bg2="dk2" tx2="lt2" accent1="accent1" accent2="accent2" accent3="accent3" accent4="accent4" accent5="accent5" accent6="accent6" hlink="hlink" folHlink="folHlink"/>
+  </p:clrMapOvr>
+</p:sld>
+</file>
+
+<file path=ppt/slides/slide14.xml><?xml version="1.0" encoding="utf-8"?>
+<p:sld xmlns:a="http://schemas.openxmlformats.org/drawingml/2006/main" xmlns:r="http://schemas.openxmlformats.org/officeDocument/2006/relationships" xmlns:p="http://schemas.openxmlformats.org/presentationml/2006/main">
+  <p:cSld>
+    <p:spTree>
+      <p:nvGrpSpPr>
+        <p:cNvPr id="1" name=""/>
+        <p:cNvGrpSpPr/>
+        <p:nvPr/>
+      </p:nvGrpSpPr>
+      <p:grpSpPr>
+        <a:xfrm>
+          <a:off x="0" y="0"/>
+          <a:ext cx="0" cy="0"/>
+          <a:chOff x="0" y="0"/>
+          <a:chExt cx="0" cy="0"/>
+        </a:xfrm>
+      </p:grpSpPr>
+      <p:sp>
+        <p:nvSpPr>
+          <p:cNvPr id="3" name="TextBox 2">
+            <a:extLst>
+              <a:ext uri="{FF2B5EF4-FFF2-40B4-BE49-F238E27FC236}">
+                <a16:creationId xmlns:a16="http://schemas.microsoft.com/office/drawing/2014/main" id="{02A0E177-FC01-4B4E-A4B8-7DF46D57ECC3}"/>
+              </a:ext>
+            </a:extLst>
+          </p:cNvPr>
+          <p:cNvSpPr txBox="1"/>
+          <p:nvPr/>
+        </p:nvSpPr>
+        <p:spPr>
+          <a:xfrm>
+            <a:off x="1272209" y="2733261"/>
+            <a:ext cx="9462052" cy="1107996"/>
+          </a:xfrm>
+          <a:prstGeom prst="rect">
+            <a:avLst/>
+          </a:prstGeom>
+          <a:noFill/>
+        </p:spPr>
+        <p:txBody>
+          <a:bodyPr wrap="square" rtlCol="0">
+            <a:spAutoFit/>
+          </a:bodyPr>
+          <a:lstStyle/>
+          <a:p>
+            <a:r>
+              <a:rPr lang="en-US" sz="6500" dirty="0">
+                <a:latin typeface="Arial Rounded MT Bold" panose="020F0704030504030204" pitchFamily="34" charset="0"/>
+                <a:ea typeface="+mj-ea"/>
+                <a:cs typeface="+mj-cs"/>
+              </a:rPr>
+              <a:t>Next Plan </a:t>
+            </a:r>
+          </a:p>
+        </p:txBody>
+      </p:sp>
+    </p:spTree>
+    <p:extLst>
+      <p:ext uri="{BB962C8B-B14F-4D97-AF65-F5344CB8AC3E}">
+        <p14:creationId xmlns:p14="http://schemas.microsoft.com/office/powerpoint/2010/main" val="3962184476"/>
+      </p:ext>
+    </p:extLst>
+  </p:cSld>
+  <p:clrMapOvr>
+    <a:masterClrMapping/>
+  </p:clrMapOvr>
+</p:sld>
+</file>
+
+<file path=ppt/slides/slide15.xml><?xml version="1.0" encoding="utf-8"?>
+<p:sld xmlns:a="http://schemas.openxmlformats.org/drawingml/2006/main" xmlns:r="http://schemas.openxmlformats.org/officeDocument/2006/relationships" xmlns:p="http://schemas.openxmlformats.org/presentationml/2006/main">
+  <p:cSld>
+    <p:spTree>
+      <p:nvGrpSpPr>
+        <p:cNvPr id="1" name=""/>
+        <p:cNvGrpSpPr/>
+        <p:nvPr/>
+      </p:nvGrpSpPr>
+      <p:grpSpPr>
+        <a:xfrm>
+          <a:off x="0" y="0"/>
+          <a:ext cx="0" cy="0"/>
+          <a:chOff x="0" y="0"/>
+          <a:chExt cx="0" cy="0"/>
+        </a:xfrm>
+      </p:grpSpPr>
+      <p:sp>
+        <p:nvSpPr>
+          <p:cNvPr id="2" name="TextBox 1">
+            <a:extLst>
+              <a:ext uri="{FF2B5EF4-FFF2-40B4-BE49-F238E27FC236}">
+                <a16:creationId xmlns:a16="http://schemas.microsoft.com/office/drawing/2014/main" id="{8C3E2E6D-F572-4DD2-8C0D-2C1281A726CC}"/>
+              </a:ext>
+            </a:extLst>
+          </p:cNvPr>
+          <p:cNvSpPr txBox="1"/>
+          <p:nvPr/>
+        </p:nvSpPr>
+        <p:spPr>
+          <a:xfrm>
+            <a:off x="1242392" y="440449"/>
+            <a:ext cx="8627166" cy="707886"/>
+          </a:xfrm>
+          <a:prstGeom prst="rect">
+            <a:avLst/>
+          </a:prstGeom>
+          <a:noFill/>
+        </p:spPr>
+        <p:txBody>
+          <a:bodyPr wrap="square" rtlCol="0">
+            <a:spAutoFit/>
+          </a:bodyPr>
+          <a:lstStyle/>
+          <a:p>
+            <a:r>
+              <a:rPr lang="en-US" sz="4000" b="1" dirty="0">
+                <a:latin typeface="Consolas" panose="020B0609020204030204" pitchFamily="49" charset="0"/>
+              </a:rPr>
+              <a:t>Sign Up &amp; Log In System</a:t>
+            </a:r>
+          </a:p>
+        </p:txBody>
+      </p:sp>
+      <p:sp>
+        <p:nvSpPr>
+          <p:cNvPr id="3" name="TextBox 2">
+            <a:extLst>
+              <a:ext uri="{FF2B5EF4-FFF2-40B4-BE49-F238E27FC236}">
+                <a16:creationId xmlns:a16="http://schemas.microsoft.com/office/drawing/2014/main" id="{55F62C06-6710-4D2A-9CFF-FC96A8D26D1A}"/>
+              </a:ext>
+            </a:extLst>
+          </p:cNvPr>
+          <p:cNvSpPr txBox="1"/>
+          <p:nvPr/>
+        </p:nvSpPr>
+        <p:spPr>
+          <a:xfrm>
+            <a:off x="954156" y="1739347"/>
+            <a:ext cx="10624931" cy="3970318"/>
+          </a:xfrm>
+          <a:prstGeom prst="rect">
+            <a:avLst/>
+          </a:prstGeom>
+          <a:noFill/>
+        </p:spPr>
+        <p:txBody>
+          <a:bodyPr wrap="square" rtlCol="0">
+            <a:spAutoFit/>
+          </a:bodyPr>
+          <a:lstStyle/>
+          <a:p>
+            <a:pPr marL="285750" indent="-285750">
+              <a:buFont typeface="Wingdings" panose="05000000000000000000" pitchFamily="2" charset="2"/>
+              <a:buChar char="q"/>
+            </a:pPr>
+            <a:r>
+              <a:rPr lang="en-US" sz="2800" dirty="0">
+                <a:latin typeface="Bahnschrift SemiBold" panose="020B0502040204020203" pitchFamily="34" charset="0"/>
+              </a:rPr>
+              <a:t> </a:t>
+            </a:r>
+            <a:r>
+              <a:rPr lang="en-US" sz="2800" b="1" dirty="0"/>
+              <a:t>User Registration: </a:t>
+            </a:r>
+            <a:r>
+              <a:rPr lang="en-US" sz="2800" dirty="0"/>
+              <a:t>Allow users to create an account by providing essential information like name, email, username and password.</a:t>
+            </a:r>
+          </a:p>
+          <a:p>
+            <a:pPr marL="285750" indent="-285750">
+              <a:buFont typeface="Wingdings" panose="05000000000000000000" pitchFamily="2" charset="2"/>
+              <a:buChar char="q"/>
+            </a:pPr>
+            <a:endParaRPr lang="en-US" sz="2800" dirty="0">
+              <a:latin typeface="Bahnschrift SemiBold" panose="020B0502040204020203" pitchFamily="34" charset="0"/>
+            </a:endParaRPr>
+          </a:p>
+          <a:p>
+            <a:pPr marL="285750" indent="-285750">
+              <a:buFont typeface="Wingdings" panose="05000000000000000000" pitchFamily="2" charset="2"/>
+              <a:buChar char="q"/>
+            </a:pPr>
+            <a:r>
+              <a:rPr lang="en-US" sz="2800" dirty="0">
+                <a:latin typeface="Bahnschrift SemiBold" panose="020B0502040204020203" pitchFamily="34" charset="0"/>
+              </a:rPr>
+              <a:t> </a:t>
+            </a:r>
+            <a:r>
+              <a:rPr lang="en-US" sz="2800" b="1" dirty="0"/>
+              <a:t>Secure Authentication: Password Encryption technique</a:t>
+            </a:r>
+            <a:r>
+              <a:rPr lang="en-US" sz="2800" dirty="0"/>
+              <a:t> </a:t>
+            </a:r>
+            <a:r>
+              <a:rPr lang="en-US" sz="2800" b="1" dirty="0"/>
+              <a:t>to </a:t>
+            </a:r>
+            <a:r>
+              <a:rPr lang="en-US" sz="2800" dirty="0"/>
+              <a:t>store passwords securely.</a:t>
+            </a:r>
+          </a:p>
+          <a:p>
+            <a:pPr marL="285750" indent="-285750">
+              <a:buFont typeface="Wingdings" panose="05000000000000000000" pitchFamily="2" charset="2"/>
+              <a:buChar char="q"/>
+            </a:pPr>
+            <a:endParaRPr lang="en-US" sz="2800" dirty="0"/>
+          </a:p>
+          <a:p>
+            <a:pPr marL="285750" indent="-285750">
+              <a:buFont typeface="Wingdings" panose="05000000000000000000" pitchFamily="2" charset="2"/>
+              <a:buChar char="q"/>
+            </a:pPr>
+            <a:r>
+              <a:rPr lang="en-US" sz="2800" b="1" dirty="0"/>
+              <a:t> User Profile Management: </a:t>
+            </a:r>
+            <a:r>
+              <a:rPr lang="en-US" sz="2800" dirty="0"/>
+              <a:t>Allow users to update their profile information.</a:t>
+            </a:r>
+            <a:endParaRPr lang="en-US" sz="1600" dirty="0">
+              <a:latin typeface="Bahnschrift SemiBold" panose="020B0502040204020203" pitchFamily="34" charset="0"/>
+            </a:endParaRPr>
+          </a:p>
+        </p:txBody>
+      </p:sp>
+    </p:spTree>
+    <p:extLst>
+      <p:ext uri="{BB962C8B-B14F-4D97-AF65-F5344CB8AC3E}">
+        <p14:creationId xmlns:p14="http://schemas.microsoft.com/office/powerpoint/2010/main" val="2833559076"/>
+      </p:ext>
+    </p:extLst>
+  </p:cSld>
+  <p:clrMapOvr>
+    <a:masterClrMapping/>
+  </p:clrMapOvr>
+</p:sld>
+</file>
+
+<file path=ppt/slides/slide16.xml><?xml version="1.0" encoding="utf-8"?>
+<p:sld xmlns:a="http://schemas.openxmlformats.org/drawingml/2006/main" xmlns:r="http://schemas.openxmlformats.org/officeDocument/2006/relationships" xmlns:p="http://schemas.openxmlformats.org/presentationml/2006/main">
+  <p:cSld>
+    <p:spTree>
+      <p:nvGrpSpPr>
+        <p:cNvPr id="1" name=""/>
+        <p:cNvGrpSpPr/>
+        <p:nvPr/>
+      </p:nvGrpSpPr>
+      <p:grpSpPr>
+        <a:xfrm>
+          <a:off x="0" y="0"/>
+          <a:ext cx="0" cy="0"/>
+          <a:chOff x="0" y="0"/>
+          <a:chExt cx="0" cy="0"/>
+        </a:xfrm>
+      </p:grpSpPr>
+      <p:sp>
+        <p:nvSpPr>
+          <p:cNvPr id="2" name="TextBox 1">
+            <a:extLst>
+              <a:ext uri="{FF2B5EF4-FFF2-40B4-BE49-F238E27FC236}">
+                <a16:creationId xmlns:a16="http://schemas.microsoft.com/office/drawing/2014/main" id="{DCAF674C-4CED-43EC-908D-C45C22140FEA}"/>
+              </a:ext>
+            </a:extLst>
+          </p:cNvPr>
+          <p:cNvSpPr txBox="1"/>
+          <p:nvPr/>
+        </p:nvSpPr>
+        <p:spPr>
+          <a:xfrm>
+            <a:off x="1192695" y="477078"/>
+            <a:ext cx="7116417" cy="707886"/>
+          </a:xfrm>
+          <a:prstGeom prst="rect">
+            <a:avLst/>
+          </a:prstGeom>
+          <a:noFill/>
+        </p:spPr>
+        <p:txBody>
+          <a:bodyPr wrap="square" rtlCol="0">
+            <a:spAutoFit/>
+          </a:bodyPr>
+          <a:lstStyle/>
+          <a:p>
+            <a:r>
+              <a:rPr lang="en-US" sz="4000" b="1" dirty="0">
+                <a:latin typeface="Consolas" panose="020B0609020204030204" pitchFamily="49" charset="0"/>
+              </a:rPr>
+              <a:t>Game Development</a:t>
+            </a:r>
+          </a:p>
+        </p:txBody>
+      </p:sp>
+      <p:sp>
+        <p:nvSpPr>
+          <p:cNvPr id="3" name="TextBox 2">
+            <a:extLst>
+              <a:ext uri="{FF2B5EF4-FFF2-40B4-BE49-F238E27FC236}">
+                <a16:creationId xmlns:a16="http://schemas.microsoft.com/office/drawing/2014/main" id="{67AA2667-78DD-414C-8277-725D235BA256}"/>
+              </a:ext>
+            </a:extLst>
+          </p:cNvPr>
+          <p:cNvSpPr txBox="1"/>
+          <p:nvPr/>
+        </p:nvSpPr>
+        <p:spPr>
+          <a:xfrm>
+            <a:off x="1071769" y="1560442"/>
+            <a:ext cx="10048461" cy="4536819"/>
+          </a:xfrm>
+          <a:prstGeom prst="rect">
+            <a:avLst/>
+          </a:prstGeom>
+          <a:noFill/>
+        </p:spPr>
+        <p:txBody>
+          <a:bodyPr wrap="square" rtlCol="0">
+            <a:spAutoFit/>
+          </a:bodyPr>
+          <a:lstStyle/>
+          <a:p>
+            <a:pPr marL="457200" indent="-457200">
+              <a:lnSpc>
+                <a:spcPct val="150000"/>
+              </a:lnSpc>
+              <a:buFont typeface="Wingdings" panose="05000000000000000000" pitchFamily="2" charset="2"/>
+              <a:buChar char="Ø"/>
+            </a:pPr>
+            <a:r>
+              <a:rPr lang="en-US" sz="2800" dirty="0"/>
+              <a:t>A </a:t>
+            </a:r>
+            <a:r>
+              <a:rPr lang="en-US" sz="2800" b="1" dirty="0"/>
+              <a:t>console based game </a:t>
+            </a:r>
+            <a:r>
+              <a:rPr lang="en-US" sz="2800" dirty="0"/>
+              <a:t>where character / word will falling from up screen.</a:t>
+            </a:r>
+          </a:p>
+          <a:p>
+            <a:pPr marL="457200" indent="-457200">
+              <a:lnSpc>
+                <a:spcPct val="150000"/>
+              </a:lnSpc>
+              <a:buFont typeface="Wingdings" panose="05000000000000000000" pitchFamily="2" charset="2"/>
+              <a:buChar char="Ø"/>
+            </a:pPr>
+            <a:r>
+              <a:rPr lang="en-US" sz="2800" dirty="0"/>
+              <a:t>User have to type word correctly before they reach bottom of the screen. </a:t>
+            </a:r>
+          </a:p>
+          <a:p>
+            <a:pPr marL="457200" indent="-457200">
+              <a:lnSpc>
+                <a:spcPct val="150000"/>
+              </a:lnSpc>
+              <a:buFont typeface="Wingdings" panose="05000000000000000000" pitchFamily="2" charset="2"/>
+              <a:buChar char="Ø"/>
+            </a:pPr>
+            <a:r>
+              <a:rPr lang="en-US" sz="2800" dirty="0"/>
+              <a:t>Game will continue </a:t>
+            </a:r>
+            <a:r>
+              <a:rPr lang="en-US" sz="2800" dirty="0" err="1"/>
+              <a:t>upto</a:t>
+            </a:r>
+            <a:r>
+              <a:rPr lang="en-US" sz="2800" dirty="0"/>
+              <a:t> a certain number of chance.</a:t>
+            </a:r>
+          </a:p>
+          <a:p>
+            <a:pPr marL="457200" indent="-457200">
+              <a:lnSpc>
+                <a:spcPct val="150000"/>
+              </a:lnSpc>
+              <a:buFont typeface="Wingdings" panose="05000000000000000000" pitchFamily="2" charset="2"/>
+              <a:buChar char="Ø"/>
+            </a:pPr>
+            <a:r>
+              <a:rPr lang="en-US" sz="2800" dirty="0"/>
+              <a:t>Using </a:t>
+            </a:r>
+            <a:r>
+              <a:rPr lang="en-US" sz="2800" b="1" dirty="0"/>
+              <a:t>Multithreaded Programming </a:t>
+            </a:r>
+            <a:r>
+              <a:rPr lang="en-US" sz="2800" dirty="0"/>
+              <a:t>to show Speed, Accuracy, Score parallelly to the gameplay.</a:t>
+            </a:r>
+          </a:p>
+        </p:txBody>
+      </p:sp>
+    </p:spTree>
+    <p:extLst>
+      <p:ext uri="{BB962C8B-B14F-4D97-AF65-F5344CB8AC3E}">
+        <p14:creationId xmlns:p14="http://schemas.microsoft.com/office/powerpoint/2010/main" val="1791596087"/>
+      </p:ext>
+    </p:extLst>
+  </p:cSld>
+  <p:clrMapOvr>
+    <a:masterClrMapping/>
+  </p:clrMapOvr>
+</p:sld>
+</file>
+
+<file path=ppt/slides/slide17.xml><?xml version="1.0" encoding="utf-8"?>
+<p:sld xmlns:a="http://schemas.openxmlformats.org/drawingml/2006/main" xmlns:r="http://schemas.openxmlformats.org/officeDocument/2006/relationships" xmlns:p="http://schemas.openxmlformats.org/presentationml/2006/main">
+  <p:cSld>
+    <p:spTree>
+      <p:nvGrpSpPr>
+        <p:cNvPr id="1" name=""/>
+        <p:cNvGrpSpPr/>
+        <p:nvPr/>
+      </p:nvGrpSpPr>
+      <p:grpSpPr>
+        <a:xfrm>
+          <a:off x="0" y="0"/>
+          <a:ext cx="0" cy="0"/>
+          <a:chOff x="0" y="0"/>
+          <a:chExt cx="0" cy="0"/>
+        </a:xfrm>
+      </p:grpSpPr>
+      <p:sp>
+        <p:nvSpPr>
+          <p:cNvPr id="2" name="TextBox 1">
+            <a:extLst>
+              <a:ext uri="{FF2B5EF4-FFF2-40B4-BE49-F238E27FC236}">
+                <a16:creationId xmlns:a16="http://schemas.microsoft.com/office/drawing/2014/main" id="{4DEA34BD-B80F-4E46-90A2-12F638FCE7F6}"/>
+              </a:ext>
+            </a:extLst>
+          </p:cNvPr>
+          <p:cNvSpPr txBox="1"/>
+          <p:nvPr/>
+        </p:nvSpPr>
+        <p:spPr>
+          <a:xfrm>
+            <a:off x="1282148" y="516835"/>
+            <a:ext cx="7136296" cy="707886"/>
+          </a:xfrm>
+          <a:prstGeom prst="rect">
+            <a:avLst/>
+          </a:prstGeom>
+          <a:noFill/>
+        </p:spPr>
+        <p:txBody>
+          <a:bodyPr wrap="square" rtlCol="0">
+            <a:spAutoFit/>
+          </a:bodyPr>
+          <a:lstStyle/>
+          <a:p>
+            <a:r>
+              <a:rPr lang="en-US" sz="4000" b="1" dirty="0">
+                <a:latin typeface="Consolas" panose="020B0609020204030204" pitchFamily="49" charset="0"/>
+              </a:rPr>
+              <a:t>Performance Analysis </a:t>
+            </a:r>
+          </a:p>
+        </p:txBody>
+      </p:sp>
+      <p:sp>
+        <p:nvSpPr>
+          <p:cNvPr id="3" name="TextBox 2">
+            <a:extLst>
+              <a:ext uri="{FF2B5EF4-FFF2-40B4-BE49-F238E27FC236}">
+                <a16:creationId xmlns:a16="http://schemas.microsoft.com/office/drawing/2014/main" id="{DE4895FA-EAF2-42A3-859E-D1CEDE653ADE}"/>
+              </a:ext>
+            </a:extLst>
+          </p:cNvPr>
+          <p:cNvSpPr txBox="1"/>
+          <p:nvPr/>
+        </p:nvSpPr>
+        <p:spPr>
+          <a:xfrm>
+            <a:off x="1212573" y="1806921"/>
+            <a:ext cx="10446026" cy="3244158"/>
+          </a:xfrm>
+          <a:prstGeom prst="rect">
+            <a:avLst/>
+          </a:prstGeom>
+          <a:noFill/>
+        </p:spPr>
+        <p:txBody>
+          <a:bodyPr wrap="square" rtlCol="0">
+            <a:spAutoFit/>
+          </a:bodyPr>
+          <a:lstStyle/>
+          <a:p>
+            <a:pPr marL="285750" indent="-285750">
+              <a:lnSpc>
+                <a:spcPct val="150000"/>
+              </a:lnSpc>
+              <a:buFont typeface="Wingdings" panose="05000000000000000000" pitchFamily="2" charset="2"/>
+              <a:buChar char="q"/>
+            </a:pPr>
+            <a:r>
+              <a:rPr lang="en-US" sz="2800" dirty="0"/>
+              <a:t> Use of </a:t>
+            </a:r>
+            <a:r>
+              <a:rPr lang="en-US" sz="2800" b="1" dirty="0"/>
+              <a:t>CSV</a:t>
+            </a:r>
+            <a:r>
+              <a:rPr lang="en-US" sz="2800" dirty="0"/>
+              <a:t> file</a:t>
+            </a:r>
+          </a:p>
+          <a:p>
+            <a:pPr marL="285750" indent="-285750">
+              <a:lnSpc>
+                <a:spcPct val="150000"/>
+              </a:lnSpc>
+              <a:buFont typeface="Wingdings" panose="05000000000000000000" pitchFamily="2" charset="2"/>
+              <a:buChar char="q"/>
+            </a:pPr>
+            <a:r>
+              <a:rPr lang="en-US" sz="2800" dirty="0"/>
+              <a:t> Each users’ performance will be stored in separate CSV file </a:t>
+            </a:r>
+          </a:p>
+          <a:p>
+            <a:pPr marL="285750" indent="-285750">
+              <a:lnSpc>
+                <a:spcPct val="150000"/>
+              </a:lnSpc>
+              <a:buFont typeface="Wingdings" panose="05000000000000000000" pitchFamily="2" charset="2"/>
+              <a:buChar char="q"/>
+            </a:pPr>
+            <a:r>
+              <a:rPr lang="en-US" sz="2800" dirty="0"/>
+              <a:t> Typing accuracy &amp; speed analysis</a:t>
+            </a:r>
+          </a:p>
+          <a:p>
+            <a:pPr marL="285750" indent="-285750">
+              <a:lnSpc>
+                <a:spcPct val="150000"/>
+              </a:lnSpc>
+              <a:buFont typeface="Wingdings" panose="05000000000000000000" pitchFamily="2" charset="2"/>
+              <a:buChar char="q"/>
+            </a:pPr>
+            <a:r>
+              <a:rPr lang="en-US" sz="2800" dirty="0"/>
+              <a:t> Progress Analysis</a:t>
+            </a:r>
+          </a:p>
+          <a:p>
+            <a:pPr marL="285750" indent="-285750">
+              <a:lnSpc>
+                <a:spcPct val="150000"/>
+              </a:lnSpc>
+              <a:buFont typeface="Wingdings" panose="05000000000000000000" pitchFamily="2" charset="2"/>
+              <a:buChar char="q"/>
+            </a:pPr>
+            <a:r>
+              <a:rPr lang="en-US" sz="2800" dirty="0"/>
+              <a:t> Typing pattern analysis</a:t>
+            </a:r>
+          </a:p>
+        </p:txBody>
+      </p:sp>
+    </p:spTree>
+    <p:extLst>
+      <p:ext uri="{BB962C8B-B14F-4D97-AF65-F5344CB8AC3E}">
+        <p14:creationId xmlns:p14="http://schemas.microsoft.com/office/powerpoint/2010/main" val="2832209558"/>
+      </p:ext>
+    </p:extLst>
+  </p:cSld>
+  <p:clrMapOvr>
+    <a:masterClrMapping/>
+  </p:clrMapOvr>
+</p:sld>
+</file>
+
+<file path=ppt/slides/slide18.xml><?xml version="1.0" encoding="utf-8"?>
+<p:sld xmlns:a="http://schemas.openxmlformats.org/drawingml/2006/main" xmlns:r="http://schemas.openxmlformats.org/officeDocument/2006/relationships" xmlns:p="http://schemas.openxmlformats.org/presentationml/2006/main">
+  <p:cSld>
+    <p:spTree>
+      <p:nvGrpSpPr>
+        <p:cNvPr id="1" name=""/>
+        <p:cNvGrpSpPr/>
+        <p:nvPr/>
+      </p:nvGrpSpPr>
+      <p:grpSpPr>
+        <a:xfrm>
+          <a:off x="0" y="0"/>
+          <a:ext cx="0" cy="0"/>
+          <a:chOff x="0" y="0"/>
+          <a:chExt cx="0" cy="0"/>
+        </a:xfrm>
+      </p:grpSpPr>
+      <p:sp>
+        <p:nvSpPr>
+          <p:cNvPr id="2" name="TextBox 1">
+            <a:extLst>
+              <a:ext uri="{FF2B5EF4-FFF2-40B4-BE49-F238E27FC236}">
+                <a16:creationId xmlns:a16="http://schemas.microsoft.com/office/drawing/2014/main" id="{3CB43BB9-BC84-4630-9E03-D8605995D8ED}"/>
+              </a:ext>
+            </a:extLst>
+          </p:cNvPr>
+          <p:cNvSpPr txBox="1"/>
+          <p:nvPr/>
+        </p:nvSpPr>
+        <p:spPr>
+          <a:xfrm>
+            <a:off x="1421296" y="506896"/>
+            <a:ext cx="7732644" cy="707886"/>
+          </a:xfrm>
+          <a:prstGeom prst="rect">
+            <a:avLst/>
+          </a:prstGeom>
+          <a:noFill/>
+        </p:spPr>
+        <p:txBody>
+          <a:bodyPr wrap="square" rtlCol="0">
+            <a:spAutoFit/>
+          </a:bodyPr>
+          <a:lstStyle/>
+          <a:p>
+            <a:r>
+              <a:rPr lang="en-US" sz="4000" b="1" dirty="0">
+                <a:latin typeface="Consolas" panose="020B0609020204030204" pitchFamily="49" charset="0"/>
+              </a:rPr>
+              <a:t>Regression Analysis</a:t>
+            </a:r>
+          </a:p>
+        </p:txBody>
+      </p:sp>
+      <p:sp>
+        <p:nvSpPr>
+          <p:cNvPr id="3" name="TextBox 2">
+            <a:extLst>
+              <a:ext uri="{FF2B5EF4-FFF2-40B4-BE49-F238E27FC236}">
+                <a16:creationId xmlns:a16="http://schemas.microsoft.com/office/drawing/2014/main" id="{C838F9AD-C44A-493A-98E3-B56DB7D5DE65}"/>
+              </a:ext>
+            </a:extLst>
+          </p:cNvPr>
+          <p:cNvSpPr txBox="1"/>
+          <p:nvPr/>
+        </p:nvSpPr>
+        <p:spPr>
+          <a:xfrm>
+            <a:off x="1421296" y="1570383"/>
+            <a:ext cx="9720469" cy="3244158"/>
+          </a:xfrm>
+          <a:prstGeom prst="rect">
+            <a:avLst/>
+          </a:prstGeom>
+          <a:noFill/>
+        </p:spPr>
+        <p:txBody>
+          <a:bodyPr wrap="square" rtlCol="0">
+            <a:spAutoFit/>
+          </a:bodyPr>
+          <a:lstStyle/>
+          <a:p>
+            <a:pPr marL="457200" indent="-457200">
+              <a:lnSpc>
+                <a:spcPct val="150000"/>
+              </a:lnSpc>
+              <a:buFont typeface="Wingdings" panose="05000000000000000000" pitchFamily="2" charset="2"/>
+              <a:buChar char="q"/>
+            </a:pPr>
+            <a:r>
+              <a:rPr lang="en-US" sz="2800" dirty="0"/>
+              <a:t>Analyze performance data to show improvement.</a:t>
+            </a:r>
+          </a:p>
+          <a:p>
+            <a:pPr marL="457200" indent="-457200">
+              <a:lnSpc>
+                <a:spcPct val="150000"/>
+              </a:lnSpc>
+              <a:buFont typeface="Wingdings" panose="05000000000000000000" pitchFamily="2" charset="2"/>
+              <a:buChar char="q"/>
+            </a:pPr>
+            <a:r>
+              <a:rPr lang="en-US" sz="2800" b="1" dirty="0"/>
+              <a:t>Regression analysis </a:t>
+            </a:r>
+            <a:r>
+              <a:rPr lang="en-US" sz="2800" dirty="0"/>
+              <a:t>between </a:t>
+            </a:r>
+            <a:r>
+              <a:rPr lang="en-US" sz="2800" b="1" dirty="0"/>
+              <a:t>Speed ( WPM)  </a:t>
+            </a:r>
+            <a:r>
+              <a:rPr lang="en-US" sz="2800" dirty="0"/>
+              <a:t>and   </a:t>
+            </a:r>
+            <a:r>
+              <a:rPr lang="en-US" sz="2800" b="1" dirty="0"/>
+              <a:t>Accuracy.</a:t>
+            </a:r>
+          </a:p>
+          <a:p>
+            <a:pPr marL="457200" indent="-457200">
+              <a:lnSpc>
+                <a:spcPct val="150000"/>
+              </a:lnSpc>
+              <a:buFont typeface="Wingdings" panose="05000000000000000000" pitchFamily="2" charset="2"/>
+              <a:buChar char="q"/>
+            </a:pPr>
+            <a:r>
+              <a:rPr lang="en-US" sz="2800" dirty="0"/>
+              <a:t>Check whether user is improving or not through regression analysis.</a:t>
+            </a:r>
+            <a:endParaRPr lang="en-US" sz="2800" b="1" dirty="0"/>
+          </a:p>
+        </p:txBody>
+      </p:sp>
+    </p:spTree>
+    <p:extLst>
+      <p:ext uri="{BB962C8B-B14F-4D97-AF65-F5344CB8AC3E}">
+        <p14:creationId xmlns:p14="http://schemas.microsoft.com/office/powerpoint/2010/main" val="1984689414"/>
+      </p:ext>
+    </p:extLst>
+  </p:cSld>
+  <p:clrMapOvr>
+    <a:masterClrMapping/>
+  </p:clrMapOvr>
+</p:sld>
+</file>
+
+<file path=ppt/slides/slide19.xml><?xml version="1.0" encoding="utf-8"?>
+<p:sld xmlns:a="http://schemas.openxmlformats.org/drawingml/2006/main" xmlns:r="http://schemas.openxmlformats.org/officeDocument/2006/relationships" xmlns:p="http://schemas.openxmlformats.org/presentationml/2006/main">
+  <p:cSld>
+    <p:spTree>
+      <p:nvGrpSpPr>
+        <p:cNvPr id="1" name=""/>
+        <p:cNvGrpSpPr/>
+        <p:nvPr/>
+      </p:nvGrpSpPr>
+      <p:grpSpPr>
+        <a:xfrm>
+          <a:off x="0" y="0"/>
+          <a:ext cx="0" cy="0"/>
+          <a:chOff x="0" y="0"/>
+          <a:chExt cx="0" cy="0"/>
+        </a:xfrm>
+      </p:grpSpPr>
+      <p:sp>
+        <p:nvSpPr>
+          <p:cNvPr id="2" name="TextBox 1">
+            <a:extLst>
+              <a:ext uri="{FF2B5EF4-FFF2-40B4-BE49-F238E27FC236}">
+                <a16:creationId xmlns:a16="http://schemas.microsoft.com/office/drawing/2014/main" id="{6F71F49E-7E92-4FEC-99A7-DC87E227310A}"/>
+              </a:ext>
+            </a:extLst>
+          </p:cNvPr>
+          <p:cNvSpPr txBox="1"/>
+          <p:nvPr/>
+        </p:nvSpPr>
+        <p:spPr>
+          <a:xfrm>
+            <a:off x="2676938" y="2524539"/>
+            <a:ext cx="8309113" cy="1311128"/>
+          </a:xfrm>
+          <a:prstGeom prst="rect">
+            <a:avLst/>
+          </a:prstGeom>
+          <a:noFill/>
+        </p:spPr>
+        <p:txBody>
+          <a:bodyPr wrap="square" rtlCol="0">
+            <a:spAutoFit/>
+          </a:bodyPr>
+          <a:lstStyle/>
+          <a:p>
+            <a:pPr algn="just" defTabSz="914400">
+              <a:lnSpc>
+                <a:spcPct val="90000"/>
+              </a:lnSpc>
+              <a:spcBef>
+                <a:spcPct val="0"/>
+              </a:spcBef>
+            </a:pPr>
+            <a:r>
+              <a:rPr lang="en" sz="8800" dirty="0">
+                <a:latin typeface="Arial Rounded MT Bold" panose="020F0704030504030204" pitchFamily="34" charset="0"/>
+                <a:ea typeface="+mj-ea"/>
+                <a:cs typeface="+mj-cs"/>
+                <a:sym typeface="Maven Pro"/>
+              </a:rPr>
+              <a:t>Thank You</a:t>
+            </a:r>
+            <a:endParaRPr lang="en-US" sz="8800" dirty="0">
+              <a:latin typeface="Arial Rounded MT Bold" panose="020F0704030504030204" pitchFamily="34" charset="0"/>
+              <a:ea typeface="+mj-ea"/>
+              <a:cs typeface="+mj-cs"/>
+            </a:endParaRPr>
+          </a:p>
+        </p:txBody>
+      </p:sp>
+    </p:spTree>
+    <p:extLst>
+      <p:ext uri="{BB962C8B-B14F-4D97-AF65-F5344CB8AC3E}">
+        <p14:creationId xmlns:p14="http://schemas.microsoft.com/office/powerpoint/2010/main" val="2535942500"/>
+      </p:ext>
+    </p:extLst>
+  </p:cSld>
+  <p:clrMapOvr>
+    <a:masterClrMapping/>
+  </p:clrMapOvr>
+</p:sld>
+</file>
+
+<file path=ppt/slides/slide2.xml><?xml version="1.0" encoding="utf-8"?>
+<p:sld xmlns:a="http://schemas.openxmlformats.org/drawingml/2006/main" xmlns:r="http://schemas.openxmlformats.org/officeDocument/2006/relationships" xmlns:p="http://schemas.openxmlformats.org/presentationml/2006/main">
+  <p:cSld>
+    <p:spTree>
+      <p:nvGrpSpPr>
+        <p:cNvPr id="1" name=""/>
+        <p:cNvGrpSpPr/>
+        <p:nvPr/>
+      </p:nvGrpSpPr>
+      <p:grpSpPr>
+        <a:xfrm>
+          <a:off x="0" y="0"/>
+          <a:ext cx="0" cy="0"/>
+          <a:chOff x="0" y="0"/>
+          <a:chExt cx="0" cy="0"/>
+        </a:xfrm>
+      </p:grpSpPr>
+      <p:sp>
+        <p:nvSpPr>
+          <p:cNvPr id="2" name="TextBox 1">
+            <a:extLst>
+              <a:ext uri="{FF2B5EF4-FFF2-40B4-BE49-F238E27FC236}">
+                <a16:creationId xmlns:a16="http://schemas.microsoft.com/office/drawing/2014/main" id="{A2261483-AF2B-4F10-B587-594C96E219F3}"/>
+              </a:ext>
+            </a:extLst>
+          </p:cNvPr>
+          <p:cNvSpPr txBox="1"/>
+          <p:nvPr/>
+        </p:nvSpPr>
+        <p:spPr>
+          <a:xfrm>
+            <a:off x="1212573" y="556592"/>
+            <a:ext cx="10979427" cy="1138773"/>
+          </a:xfrm>
+          <a:prstGeom prst="rect">
+            <a:avLst/>
+          </a:prstGeom>
+          <a:noFill/>
+        </p:spPr>
+        <p:txBody>
+          <a:bodyPr wrap="square" rtlCol="0">
+            <a:spAutoFit/>
+          </a:bodyPr>
+          <a:lstStyle/>
+          <a:p>
+            <a:r>
+              <a:rPr lang="en-US" sz="4800" b="1" dirty="0"/>
+              <a:t>Importance of Typing proficiency</a:t>
+            </a:r>
+            <a:endParaRPr lang="x-none" sz="4800" b="1" dirty="0"/>
+          </a:p>
+          <a:p>
+            <a:endParaRPr lang="en-US" dirty="0"/>
+          </a:p>
+        </p:txBody>
+      </p:sp>
+      <p:sp>
+        <p:nvSpPr>
+          <p:cNvPr id="4" name="TextBox 3">
+            <a:extLst>
+              <a:ext uri="{FF2B5EF4-FFF2-40B4-BE49-F238E27FC236}">
+                <a16:creationId xmlns:a16="http://schemas.microsoft.com/office/drawing/2014/main" id="{4009DF8E-9C15-4705-9B35-980B125F8FA5}"/>
+              </a:ext>
+            </a:extLst>
+          </p:cNvPr>
+          <p:cNvSpPr txBox="1"/>
+          <p:nvPr/>
+        </p:nvSpPr>
+        <p:spPr>
+          <a:xfrm>
+            <a:off x="1416325" y="2183681"/>
+            <a:ext cx="9144001" cy="3327321"/>
+          </a:xfrm>
+          <a:prstGeom prst="rect">
+            <a:avLst/>
+          </a:prstGeom>
+          <a:noFill/>
+        </p:spPr>
+        <p:txBody>
+          <a:bodyPr wrap="square" rtlCol="0">
+            <a:spAutoFit/>
+          </a:bodyPr>
+          <a:lstStyle/>
+          <a:p>
+            <a:pPr marL="571500" indent="-571500">
+              <a:lnSpc>
+                <a:spcPct val="150000"/>
+              </a:lnSpc>
+              <a:buFont typeface="Wingdings" panose="05000000000000000000" pitchFamily="2" charset="2"/>
+              <a:buChar char="q"/>
+            </a:pPr>
+            <a:r>
+              <a:rPr lang="en-US" sz="3600" dirty="0">
+                <a:latin typeface="Consolas" panose="020B0609020204030204" pitchFamily="49" charset="0"/>
+              </a:rPr>
+              <a:t> Digital Age Requirement</a:t>
+            </a:r>
+          </a:p>
+          <a:p>
+            <a:pPr marL="571500" indent="-571500">
+              <a:lnSpc>
+                <a:spcPct val="150000"/>
+              </a:lnSpc>
+              <a:buFont typeface="Wingdings" panose="05000000000000000000" pitchFamily="2" charset="2"/>
+              <a:buChar char="q"/>
+            </a:pPr>
+            <a:r>
+              <a:rPr lang="en-US" sz="3600" dirty="0">
+                <a:latin typeface="Consolas" panose="020B0609020204030204" pitchFamily="49" charset="0"/>
+              </a:rPr>
+              <a:t> Enhanced Typing Skill</a:t>
+            </a:r>
+          </a:p>
+          <a:p>
+            <a:pPr marL="571500" indent="-571500">
+              <a:lnSpc>
+                <a:spcPct val="150000"/>
+              </a:lnSpc>
+              <a:buFont typeface="Wingdings" panose="05000000000000000000" pitchFamily="2" charset="2"/>
+              <a:buChar char="q"/>
+            </a:pPr>
+            <a:r>
+              <a:rPr lang="en-US" sz="3600" dirty="0">
+                <a:latin typeface="Consolas" panose="020B0609020204030204" pitchFamily="49" charset="0"/>
+              </a:rPr>
+              <a:t> Increase Productivity</a:t>
+            </a:r>
+          </a:p>
+          <a:p>
+            <a:pPr marL="571500" indent="-571500">
+              <a:lnSpc>
+                <a:spcPct val="150000"/>
+              </a:lnSpc>
+              <a:buFont typeface="Wingdings" panose="05000000000000000000" pitchFamily="2" charset="2"/>
+              <a:buChar char="q"/>
+            </a:pPr>
+            <a:r>
+              <a:rPr lang="en-US" sz="3600" dirty="0">
+                <a:latin typeface="Consolas" panose="020B0609020204030204" pitchFamily="49" charset="0"/>
+              </a:rPr>
+              <a:t> Competitive Advantage</a:t>
+            </a:r>
+          </a:p>
+        </p:txBody>
+      </p:sp>
+    </p:spTree>
+    <p:extLst>
+      <p:ext uri="{BB962C8B-B14F-4D97-AF65-F5344CB8AC3E}">
+        <p14:creationId xmlns:p14="http://schemas.microsoft.com/office/powerpoint/2010/main" val="3381324096"/>
+      </p:ext>
+    </p:extLst>
+  </p:cSld>
+  <p:clrMapOvr>
+    <a:masterClrMapping/>
+  </p:clrMapOvr>
+</p:sld>
+</file>
+
+<file path=ppt/slides/slide3.xml><?xml version="1.0" encoding="utf-8"?>
+<p:sld xmlns:a="http://schemas.openxmlformats.org/drawingml/2006/main" xmlns:r="http://schemas.openxmlformats.org/officeDocument/2006/relationships" xmlns:p="http://schemas.openxmlformats.org/presentationml/2006/main">
+  <p:cSld>
+    <p:spTree>
+      <p:nvGrpSpPr>
+        <p:cNvPr id="1" name=""/>
+        <p:cNvGrpSpPr/>
+        <p:nvPr/>
+      </p:nvGrpSpPr>
+      <p:grpSpPr>
+        <a:xfrm>
+          <a:off x="0" y="0"/>
+          <a:ext cx="0" cy="0"/>
+          <a:chOff x="0" y="0"/>
+          <a:chExt cx="0" cy="0"/>
+        </a:xfrm>
+      </p:grpSpPr>
+      <p:sp>
+        <p:nvSpPr>
+          <p:cNvPr id="2" name="TextBox 1">
+            <a:extLst>
+              <a:ext uri="{FF2B5EF4-FFF2-40B4-BE49-F238E27FC236}">
+                <a16:creationId xmlns:a16="http://schemas.microsoft.com/office/drawing/2014/main" id="{F10BF01C-0551-43BD-ABF9-9CE7422C8B2D}"/>
+              </a:ext>
+            </a:extLst>
+          </p:cNvPr>
+          <p:cNvSpPr txBox="1"/>
+          <p:nvPr/>
+        </p:nvSpPr>
+        <p:spPr>
+          <a:xfrm>
+            <a:off x="1272209" y="550117"/>
+            <a:ext cx="6152321" cy="1077218"/>
+          </a:xfrm>
+          <a:prstGeom prst="rect">
+            <a:avLst/>
+          </a:prstGeom>
+          <a:noFill/>
+        </p:spPr>
+        <p:txBody>
+          <a:bodyPr wrap="square" rtlCol="0">
+            <a:spAutoFit/>
+          </a:bodyPr>
+          <a:lstStyle/>
+          <a:p>
+            <a:r>
+              <a:rPr lang="en-US" sz="3200" b="1" dirty="0"/>
+              <a:t>Introduction of this project </a:t>
+            </a:r>
+            <a:endParaRPr lang="x-none" sz="3200" b="1" dirty="0"/>
+          </a:p>
+          <a:p>
+            <a:endParaRPr lang="en-US" sz="3200" dirty="0">
+              <a:latin typeface="Bahnschrift SemiBold" panose="020B0502040204020203" pitchFamily="34" charset="0"/>
+            </a:endParaRPr>
+          </a:p>
+        </p:txBody>
+      </p:sp>
+      <p:sp>
+        <p:nvSpPr>
+          <p:cNvPr id="3" name="TextBox 2">
+            <a:extLst>
+              <a:ext uri="{FF2B5EF4-FFF2-40B4-BE49-F238E27FC236}">
+                <a16:creationId xmlns:a16="http://schemas.microsoft.com/office/drawing/2014/main" id="{ED775F47-6732-49A0-893E-D7EDCCA0B8FE}"/>
+              </a:ext>
+            </a:extLst>
+          </p:cNvPr>
+          <p:cNvSpPr txBox="1"/>
+          <p:nvPr/>
+        </p:nvSpPr>
+        <p:spPr>
+          <a:xfrm>
+            <a:off x="1272209" y="1500808"/>
+            <a:ext cx="9660834" cy="4524315"/>
+          </a:xfrm>
+          <a:prstGeom prst="rect">
+            <a:avLst/>
+          </a:prstGeom>
+          <a:noFill/>
+        </p:spPr>
+        <p:txBody>
+          <a:bodyPr wrap="square" rtlCol="0">
+            <a:spAutoFit/>
+          </a:bodyPr>
+          <a:lstStyle/>
+          <a:p>
+            <a:pPr algn="just"/>
+            <a:r>
+              <a:rPr lang="en-US" sz="2400" dirty="0">
+                <a:latin typeface="Proxima Nova"/>
+                <a:sym typeface="Proxima Nova"/>
+              </a:rPr>
+              <a:t>“Typing tutor and Typing Game” project is an interactive application that aims to improve users’ typing skill through 3 major features. </a:t>
+            </a:r>
+          </a:p>
+          <a:p>
+            <a:pPr algn="just"/>
+            <a:endParaRPr lang="en-US" sz="2400" dirty="0">
+              <a:latin typeface="Proxima Nova"/>
+              <a:sym typeface="Proxima Nova"/>
+            </a:endParaRPr>
+          </a:p>
+          <a:p>
+            <a:pPr marL="342900" indent="-342900" algn="just">
+              <a:buFont typeface="Wingdings" panose="05000000000000000000" pitchFamily="2" charset="2"/>
+              <a:buChar char="ü"/>
+            </a:pPr>
+            <a:r>
+              <a:rPr lang="en-US" sz="2400" b="1" dirty="0">
+                <a:latin typeface="Proxima Nova"/>
+                <a:sym typeface="Proxima Nova"/>
+              </a:rPr>
+              <a:t>Typing Tutorial </a:t>
+            </a:r>
+            <a:r>
+              <a:rPr lang="en-US" sz="2400" dirty="0">
+                <a:latin typeface="Proxima Nova"/>
+                <a:sym typeface="Proxima Nova"/>
+              </a:rPr>
+              <a:t>feature provides some technique and helpful rules which can help users to improve typing skill.</a:t>
+            </a:r>
+          </a:p>
+          <a:p>
+            <a:pPr algn="just"/>
+            <a:endParaRPr lang="en-US" sz="2400" b="1" dirty="0">
+              <a:latin typeface="Proxima Nova"/>
+              <a:sym typeface="Proxima Nova"/>
+            </a:endParaRPr>
+          </a:p>
+          <a:p>
+            <a:pPr marL="342900" indent="-342900" algn="just">
+              <a:buFont typeface="Wingdings" panose="05000000000000000000" pitchFamily="2" charset="2"/>
+              <a:buChar char="ü"/>
+            </a:pPr>
+            <a:r>
+              <a:rPr lang="en-US" sz="2400" b="1" dirty="0">
+                <a:latin typeface="Proxima Nova"/>
+                <a:sym typeface="Proxima Nova"/>
+              </a:rPr>
+              <a:t>Practice mode </a:t>
+            </a:r>
+            <a:r>
+              <a:rPr lang="en-US" sz="2400" dirty="0">
+                <a:latin typeface="Proxima Nova"/>
+                <a:sym typeface="Proxima Nova"/>
+              </a:rPr>
+              <a:t>provides</a:t>
+            </a:r>
+            <a:r>
+              <a:rPr lang="en-US" sz="2400" b="1" dirty="0">
+                <a:latin typeface="Proxima Nova"/>
+                <a:sym typeface="Proxima Nova"/>
+              </a:rPr>
+              <a:t> </a:t>
+            </a:r>
+            <a:r>
+              <a:rPr lang="en-US" sz="2400" dirty="0">
+                <a:latin typeface="Proxima Nova"/>
+                <a:sym typeface="Proxima Nova"/>
+              </a:rPr>
+              <a:t>some structured exercises like key typing, word typing, paragraph typing.</a:t>
+            </a:r>
+          </a:p>
+          <a:p>
+            <a:pPr algn="just"/>
+            <a:endParaRPr lang="en-US" sz="2400" i="1" dirty="0">
+              <a:latin typeface="Proxima Nova"/>
+              <a:sym typeface="Proxima Nova"/>
+            </a:endParaRPr>
+          </a:p>
+          <a:p>
+            <a:pPr marL="342900" indent="-342900" algn="just">
+              <a:buFont typeface="Wingdings" panose="05000000000000000000" pitchFamily="2" charset="2"/>
+              <a:buChar char="ü"/>
+            </a:pPr>
+            <a:r>
+              <a:rPr lang="en-US" sz="2400" b="1" dirty="0">
+                <a:latin typeface="Proxima Nova"/>
+                <a:sym typeface="Proxima Nova"/>
+              </a:rPr>
+              <a:t>Typing Game </a:t>
+            </a:r>
+            <a:r>
+              <a:rPr lang="en-US" sz="2400" dirty="0">
+                <a:latin typeface="Proxima Nova"/>
+                <a:sym typeface="Proxima Nova"/>
+              </a:rPr>
+              <a:t>feature adds a fun and interesting experience for users to test their accuracy and speed in an exciting game environment.  </a:t>
+            </a:r>
+          </a:p>
+        </p:txBody>
+      </p:sp>
+    </p:spTree>
+    <p:extLst>
+      <p:ext uri="{BB962C8B-B14F-4D97-AF65-F5344CB8AC3E}">
+        <p14:creationId xmlns:p14="http://schemas.microsoft.com/office/powerpoint/2010/main" val="1158789981"/>
+      </p:ext>
+    </p:extLst>
+  </p:cSld>
+  <p:clrMapOvr>
+    <a:masterClrMapping/>
+  </p:clrMapOvr>
+</p:sld>
+</file>
+
+<file path=ppt/slides/slide4.xml><?xml version="1.0" encoding="utf-8"?>
+<p:sld xmlns:a="http://schemas.openxmlformats.org/drawingml/2006/main" xmlns:r="http://schemas.openxmlformats.org/officeDocument/2006/relationships" xmlns:p="http://schemas.openxmlformats.org/presentationml/2006/main">
+  <p:cSld>
+    <p:spTree>
+      <p:nvGrpSpPr>
+        <p:cNvPr id="1" name=""/>
+        <p:cNvGrpSpPr/>
+        <p:nvPr/>
+      </p:nvGrpSpPr>
+      <p:grpSpPr>
+        <a:xfrm>
+          <a:off x="0" y="0"/>
+          <a:ext cx="0" cy="0"/>
+          <a:chOff x="0" y="0"/>
+          <a:chExt cx="0" cy="0"/>
+        </a:xfrm>
+      </p:grpSpPr>
+      <p:sp>
+        <p:nvSpPr>
+          <p:cNvPr id="2" name="TextBox 1">
+            <a:extLst>
+              <a:ext uri="{FF2B5EF4-FFF2-40B4-BE49-F238E27FC236}">
+                <a16:creationId xmlns:a16="http://schemas.microsoft.com/office/drawing/2014/main" id="{386221F9-C7B9-4128-9B68-6612EEE60BDD}"/>
+              </a:ext>
+            </a:extLst>
+          </p:cNvPr>
+          <p:cNvSpPr txBox="1"/>
+          <p:nvPr/>
+        </p:nvSpPr>
+        <p:spPr>
+          <a:xfrm>
+            <a:off x="1242391" y="387626"/>
+            <a:ext cx="8488018" cy="892552"/>
+          </a:xfrm>
+          <a:prstGeom prst="rect">
+            <a:avLst/>
+          </a:prstGeom>
+          <a:noFill/>
+        </p:spPr>
+        <p:txBody>
+          <a:bodyPr wrap="square" rtlCol="0">
+            <a:spAutoFit/>
+          </a:bodyPr>
+          <a:lstStyle/>
+          <a:p>
+            <a:r>
+              <a:rPr lang="en-US" sz="5200" b="1" dirty="0"/>
+              <a:t>Objective of this Project</a:t>
+            </a:r>
+          </a:p>
+        </p:txBody>
+      </p:sp>
+      <p:sp>
+        <p:nvSpPr>
+          <p:cNvPr id="4" name="TextBox 3">
+            <a:extLst>
+              <a:ext uri="{FF2B5EF4-FFF2-40B4-BE49-F238E27FC236}">
+                <a16:creationId xmlns:a16="http://schemas.microsoft.com/office/drawing/2014/main" id="{DF9D2C55-2922-40E1-8110-AD2920F589BA}"/>
+              </a:ext>
+            </a:extLst>
+          </p:cNvPr>
+          <p:cNvSpPr txBox="1"/>
+          <p:nvPr/>
+        </p:nvSpPr>
+        <p:spPr>
+          <a:xfrm>
+            <a:off x="1610139" y="1649896"/>
+            <a:ext cx="9342783" cy="4611519"/>
+          </a:xfrm>
+          <a:prstGeom prst="rect">
+            <a:avLst/>
+          </a:prstGeom>
+          <a:noFill/>
+        </p:spPr>
+        <p:txBody>
+          <a:bodyPr wrap="square" rtlCol="0">
+            <a:spAutoFit/>
+          </a:bodyPr>
+          <a:lstStyle/>
+          <a:p>
+            <a:pPr marL="571500" indent="-571500">
+              <a:lnSpc>
+                <a:spcPct val="150000"/>
+              </a:lnSpc>
+              <a:buFont typeface="Wingdings" panose="05000000000000000000" pitchFamily="2" charset="2"/>
+              <a:buChar char="q"/>
+            </a:pPr>
+            <a:r>
+              <a:rPr lang="en-US" sz="3600" dirty="0">
+                <a:latin typeface="Consolas" panose="020B0609020204030204" pitchFamily="49" charset="0"/>
+              </a:rPr>
+              <a:t>Improve Typing Speed</a:t>
+            </a:r>
+          </a:p>
+          <a:p>
+            <a:pPr marL="571500" indent="-571500">
+              <a:lnSpc>
+                <a:spcPct val="150000"/>
+              </a:lnSpc>
+              <a:buFont typeface="Wingdings" panose="05000000000000000000" pitchFamily="2" charset="2"/>
+              <a:buChar char="q"/>
+            </a:pPr>
+            <a:r>
+              <a:rPr lang="en-US" sz="3600" dirty="0">
+                <a:latin typeface="Consolas" panose="020B0609020204030204" pitchFamily="49" charset="0"/>
+              </a:rPr>
+              <a:t>Improve Typing Accuracy</a:t>
+            </a:r>
+          </a:p>
+          <a:p>
+            <a:pPr marL="571500" indent="-571500">
+              <a:lnSpc>
+                <a:spcPct val="150000"/>
+              </a:lnSpc>
+              <a:buFont typeface="Wingdings" panose="05000000000000000000" pitchFamily="2" charset="2"/>
+              <a:buChar char="q"/>
+            </a:pPr>
+            <a:r>
+              <a:rPr lang="en-US" sz="3600" dirty="0">
+                <a:latin typeface="Consolas" panose="020B0609020204030204" pitchFamily="49" charset="0"/>
+              </a:rPr>
+              <a:t>Performance Tracking</a:t>
+            </a:r>
+          </a:p>
+          <a:p>
+            <a:pPr marL="571500" indent="-571500">
+              <a:lnSpc>
+                <a:spcPct val="150000"/>
+              </a:lnSpc>
+              <a:buFont typeface="Wingdings" panose="05000000000000000000" pitchFamily="2" charset="2"/>
+              <a:buChar char="q"/>
+            </a:pPr>
+            <a:r>
+              <a:rPr lang="en-US" sz="3600" dirty="0">
+                <a:latin typeface="Consolas" panose="020B0609020204030204" pitchFamily="49" charset="0"/>
+              </a:rPr>
+              <a:t>Performance Analysis</a:t>
+            </a:r>
+          </a:p>
+          <a:p>
+            <a:pPr marL="571500" indent="-571500">
+              <a:lnSpc>
+                <a:spcPct val="150000"/>
+              </a:lnSpc>
+              <a:buFont typeface="Wingdings" panose="05000000000000000000" pitchFamily="2" charset="2"/>
+              <a:buChar char="q"/>
+            </a:pPr>
+            <a:r>
+              <a:rPr lang="en-US" sz="3600" dirty="0">
+                <a:latin typeface="Consolas" panose="020B0609020204030204" pitchFamily="49" charset="0"/>
+              </a:rPr>
+              <a:t>Provide Feedback</a:t>
+            </a:r>
+          </a:p>
+          <a:p>
+            <a:pPr>
+              <a:lnSpc>
+                <a:spcPct val="150000"/>
+              </a:lnSpc>
+            </a:pPr>
+            <a:endParaRPr lang="en-US" dirty="0"/>
+          </a:p>
+        </p:txBody>
+      </p:sp>
+    </p:spTree>
+    <p:extLst>
+      <p:ext uri="{BB962C8B-B14F-4D97-AF65-F5344CB8AC3E}">
+        <p14:creationId xmlns:p14="http://schemas.microsoft.com/office/powerpoint/2010/main" val="2112819046"/>
+      </p:ext>
+    </p:extLst>
+  </p:cSld>
+  <p:clrMapOvr>
+    <a:masterClrMapping/>
+  </p:clrMapOvr>
+</p:sld>
+</file>
+
+<file path=ppt/slides/slide5.xml><?xml version="1.0" encoding="utf-8"?>
+<p:sld xmlns:a="http://schemas.openxmlformats.org/drawingml/2006/main" xmlns:r="http://schemas.openxmlformats.org/officeDocument/2006/relationships" xmlns:p="http://schemas.openxmlformats.org/presentationml/2006/main">
+  <p:cSld>
+    <p:spTree>
+      <p:nvGrpSpPr>
+        <p:cNvPr id="1" name=""/>
+        <p:cNvGrpSpPr/>
+        <p:nvPr/>
+      </p:nvGrpSpPr>
+      <p:grpSpPr>
+        <a:xfrm>
+          <a:off x="0" y="0"/>
+          <a:ext cx="0" cy="0"/>
+          <a:chOff x="0" y="0"/>
+          <a:chExt cx="0" cy="0"/>
+        </a:xfrm>
+      </p:grpSpPr>
+      <p:sp>
+        <p:nvSpPr>
+          <p:cNvPr id="2" name="TextBox 1">
+            <a:extLst>
+              <a:ext uri="{FF2B5EF4-FFF2-40B4-BE49-F238E27FC236}">
+                <a16:creationId xmlns:a16="http://schemas.microsoft.com/office/drawing/2014/main" id="{60206AAC-4EB6-4BA1-BA4C-831B5A2952EF}"/>
+              </a:ext>
+            </a:extLst>
+          </p:cNvPr>
+          <p:cNvSpPr txBox="1"/>
+          <p:nvPr/>
+        </p:nvSpPr>
+        <p:spPr>
+          <a:xfrm>
+            <a:off x="1138031" y="335845"/>
+            <a:ext cx="9915938" cy="892552"/>
+          </a:xfrm>
+          <a:prstGeom prst="rect">
+            <a:avLst/>
+          </a:prstGeom>
+          <a:noFill/>
+        </p:spPr>
+        <p:txBody>
+          <a:bodyPr wrap="square" rtlCol="0">
+            <a:spAutoFit/>
+          </a:bodyPr>
+          <a:lstStyle/>
+          <a:p>
+            <a:pPr algn="just"/>
+            <a:r>
+              <a:rPr lang="en" sz="5200" b="1" dirty="0"/>
+              <a:t>The Problems and Challenges</a:t>
+            </a:r>
+            <a:endParaRPr lang="en-US" sz="5200" dirty="0"/>
+          </a:p>
+        </p:txBody>
+      </p:sp>
+      <p:sp>
+        <p:nvSpPr>
+          <p:cNvPr id="4" name="TextBox 3">
+            <a:extLst>
+              <a:ext uri="{FF2B5EF4-FFF2-40B4-BE49-F238E27FC236}">
+                <a16:creationId xmlns:a16="http://schemas.microsoft.com/office/drawing/2014/main" id="{028833E6-1DD8-43DE-979F-7B34E83E37DF}"/>
+              </a:ext>
+            </a:extLst>
+          </p:cNvPr>
+          <p:cNvSpPr txBox="1"/>
+          <p:nvPr/>
+        </p:nvSpPr>
+        <p:spPr>
+          <a:xfrm>
+            <a:off x="1292087" y="1568995"/>
+            <a:ext cx="10147853" cy="3970318"/>
+          </a:xfrm>
+          <a:prstGeom prst="rect">
+            <a:avLst/>
+          </a:prstGeom>
+          <a:noFill/>
+        </p:spPr>
+        <p:txBody>
+          <a:bodyPr wrap="square" rtlCol="0">
+            <a:spAutoFit/>
+          </a:bodyPr>
+          <a:lstStyle/>
+          <a:p>
+            <a:pPr marL="571500" indent="-571500">
+              <a:buFont typeface="Wingdings" panose="05000000000000000000" pitchFamily="2" charset="2"/>
+              <a:buChar char="q"/>
+            </a:pPr>
+            <a:r>
+              <a:rPr lang="en-US" sz="3600" dirty="0">
+                <a:latin typeface="Consolas" panose="020B0609020204030204" pitchFamily="49" charset="0"/>
+              </a:rPr>
+              <a:t>Register &amp; Login System</a:t>
+            </a:r>
+          </a:p>
+          <a:p>
+            <a:pPr marL="571500" indent="-571500">
+              <a:buFont typeface="Wingdings" panose="05000000000000000000" pitchFamily="2" charset="2"/>
+              <a:buChar char="q"/>
+            </a:pPr>
+            <a:r>
+              <a:rPr lang="en-US" sz="3600" dirty="0">
+                <a:latin typeface="Consolas" panose="020B0609020204030204" pitchFamily="49" charset="0"/>
+              </a:rPr>
+              <a:t>Accuracy &amp; Speed Test</a:t>
+            </a:r>
+          </a:p>
+          <a:p>
+            <a:pPr marL="571500" indent="-571500">
+              <a:buFont typeface="Wingdings" panose="05000000000000000000" pitchFamily="2" charset="2"/>
+              <a:buChar char="q"/>
+            </a:pPr>
+            <a:r>
+              <a:rPr lang="en-US" sz="3600" dirty="0">
+                <a:latin typeface="Consolas" panose="020B0609020204030204" pitchFamily="49" charset="0"/>
+              </a:rPr>
+              <a:t>Users Performance Tracking</a:t>
+            </a:r>
+          </a:p>
+          <a:p>
+            <a:pPr marL="571500" indent="-571500">
+              <a:buFont typeface="Wingdings" panose="05000000000000000000" pitchFamily="2" charset="2"/>
+              <a:buChar char="q"/>
+            </a:pPr>
+            <a:r>
+              <a:rPr lang="en-US" sz="3600" dirty="0">
+                <a:latin typeface="Consolas" panose="020B0609020204030204" pitchFamily="49" charset="0"/>
+              </a:rPr>
+              <a:t>Performance Analysis</a:t>
+            </a:r>
+          </a:p>
+          <a:p>
+            <a:pPr marL="571500" indent="-571500">
+              <a:buFont typeface="Wingdings" panose="05000000000000000000" pitchFamily="2" charset="2"/>
+              <a:buChar char="q"/>
+            </a:pPr>
+            <a:r>
+              <a:rPr lang="en-US" sz="3600" dirty="0">
+                <a:latin typeface="Consolas" panose="020B0609020204030204" pitchFamily="49" charset="0"/>
+              </a:rPr>
+              <a:t>Game Development</a:t>
+            </a:r>
+          </a:p>
+          <a:p>
+            <a:pPr marL="571500" indent="-571500">
+              <a:buFont typeface="Wingdings" panose="05000000000000000000" pitchFamily="2" charset="2"/>
+              <a:buChar char="q"/>
+            </a:pPr>
+            <a:r>
+              <a:rPr lang="en-US" sz="3600" dirty="0">
+                <a:latin typeface="Consolas" panose="020B0609020204030204" pitchFamily="49" charset="0"/>
+              </a:rPr>
+              <a:t>Multithreaded Programming</a:t>
+            </a:r>
+          </a:p>
+          <a:p>
+            <a:pPr marL="571500" indent="-571500">
+              <a:buFont typeface="Wingdings" panose="05000000000000000000" pitchFamily="2" charset="2"/>
+              <a:buChar char="q"/>
+            </a:pPr>
+            <a:r>
+              <a:rPr lang="en-US" sz="3600" dirty="0">
+                <a:latin typeface="Consolas" panose="020B0609020204030204" pitchFamily="49" charset="0"/>
+              </a:rPr>
+              <a:t>Regression Analysis </a:t>
+            </a:r>
+          </a:p>
+        </p:txBody>
+      </p:sp>
+    </p:spTree>
+    <p:extLst>
+      <p:ext uri="{BB962C8B-B14F-4D97-AF65-F5344CB8AC3E}">
+        <p14:creationId xmlns:p14="http://schemas.microsoft.com/office/powerpoint/2010/main" val="878249981"/>
+      </p:ext>
+    </p:extLst>
+  </p:cSld>
+  <p:clrMapOvr>
+    <a:masterClrMapping/>
+  </p:clrMapOvr>
+</p:sld>
+</file>
+
+<file path=ppt/slides/slide6.xml><?xml version="1.0" encoding="utf-8"?>
+<p:sld xmlns:a="http://schemas.openxmlformats.org/drawingml/2006/main" xmlns:r="http://schemas.openxmlformats.org/officeDocument/2006/relationships" xmlns:p="http://schemas.openxmlformats.org/presentationml/2006/main">
+  <p:cSld>
+    <p:spTree>
+      <p:nvGrpSpPr>
+        <p:cNvPr id="1" name=""/>
+        <p:cNvGrpSpPr/>
+        <p:nvPr/>
+      </p:nvGrpSpPr>
+      <p:grpSpPr>
+        <a:xfrm>
+          <a:off x="0" y="0"/>
+          <a:ext cx="0" cy="0"/>
+          <a:chOff x="0" y="0"/>
+          <a:chExt cx="0" cy="0"/>
+        </a:xfrm>
+      </p:grpSpPr>
+      <p:sp>
+        <p:nvSpPr>
+          <p:cNvPr id="2" name="Title 1">
+            <a:extLst>
+              <a:ext uri="{FF2B5EF4-FFF2-40B4-BE49-F238E27FC236}">
+                <a16:creationId xmlns:a16="http://schemas.microsoft.com/office/drawing/2014/main" id="{FABF9B43-A57D-48A7-972D-AC5B15210305}"/>
+              </a:ext>
+            </a:extLst>
+          </p:cNvPr>
+          <p:cNvSpPr>
+            <a:spLocks noGrp="1"/>
+          </p:cNvSpPr>
+          <p:nvPr>
+            <p:ph type="title" idx="4294967295"/>
+          </p:nvPr>
+        </p:nvSpPr>
+        <p:spPr>
+          <a:xfrm>
+            <a:off x="1389063" y="2757488"/>
+            <a:ext cx="7958137" cy="1077912"/>
+          </a:xfrm>
+        </p:spPr>
+        <p:txBody>
+          <a:bodyPr>
+            <a:normAutofit fontScale="90000"/>
+          </a:bodyPr>
+          <a:lstStyle/>
+          <a:p>
+            <a:pPr algn="just"/>
+            <a:r>
+              <a:rPr lang="en-US" sz="7200" dirty="0">
+                <a:latin typeface="Arial Rounded MT Bold" panose="020F0704030504030204" pitchFamily="34" charset="0"/>
+              </a:rPr>
+              <a:t>Progress till today</a:t>
+            </a:r>
+          </a:p>
+        </p:txBody>
+      </p:sp>
+    </p:spTree>
+    <p:extLst>
+      <p:ext uri="{BB962C8B-B14F-4D97-AF65-F5344CB8AC3E}">
+        <p14:creationId xmlns:p14="http://schemas.microsoft.com/office/powerpoint/2010/main" val="3175346536"/>
+      </p:ext>
+    </p:extLst>
+  </p:cSld>
+  <p:clrMapOvr>
+    <a:masterClrMapping/>
+  </p:clrMapOvr>
+</p:sld>
+</file>
+
+<file path=ppt/slides/slide7.xml><?xml version="1.0" encoding="utf-8"?>
+<p:sld xmlns:a="http://schemas.openxmlformats.org/drawingml/2006/main" xmlns:r="http://schemas.openxmlformats.org/officeDocument/2006/relationships" xmlns:p="http://schemas.openxmlformats.org/presentationml/2006/main">
+  <p:cSld>
+    <p:spTree>
+      <p:nvGrpSpPr>
+        <p:cNvPr id="1" name=""/>
+        <p:cNvGrpSpPr/>
+        <p:nvPr/>
+      </p:nvGrpSpPr>
+      <p:grpSpPr>
+        <a:xfrm>
+          <a:off x="0" y="0"/>
+          <a:ext cx="0" cy="0"/>
+          <a:chOff x="0" y="0"/>
+          <a:chExt cx="0" cy="0"/>
+        </a:xfrm>
+      </p:grpSpPr>
+      <p:sp>
+        <p:nvSpPr>
+          <p:cNvPr id="3" name="TextBox 2">
+            <a:extLst>
+              <a:ext uri="{FF2B5EF4-FFF2-40B4-BE49-F238E27FC236}">
+                <a16:creationId xmlns:a16="http://schemas.microsoft.com/office/drawing/2014/main" id="{F3E6AD8F-F9DA-4DD5-8FB7-9241E7E5C3E9}"/>
+              </a:ext>
+            </a:extLst>
+          </p:cNvPr>
+          <p:cNvSpPr txBox="1"/>
+          <p:nvPr/>
+        </p:nvSpPr>
+        <p:spPr>
+          <a:xfrm>
+            <a:off x="1292087" y="467140"/>
+            <a:ext cx="6559826" cy="769441"/>
+          </a:xfrm>
+          <a:prstGeom prst="rect">
+            <a:avLst/>
+          </a:prstGeom>
+          <a:noFill/>
+        </p:spPr>
+        <p:txBody>
+          <a:bodyPr wrap="square" rtlCol="0">
+            <a:spAutoFit/>
+          </a:bodyPr>
+          <a:lstStyle/>
+          <a:p>
+            <a:r>
+              <a:rPr lang="en-US" sz="4400" b="1" dirty="0">
+                <a:latin typeface="Consolas" panose="020B0609020204030204" pitchFamily="49" charset="0"/>
+              </a:rPr>
+              <a:t>Main Menu</a:t>
+            </a:r>
+          </a:p>
+        </p:txBody>
+      </p:sp>
+      <p:sp>
+        <p:nvSpPr>
+          <p:cNvPr id="8" name="TextBox 7">
+            <a:extLst>
+              <a:ext uri="{FF2B5EF4-FFF2-40B4-BE49-F238E27FC236}">
+                <a16:creationId xmlns:a16="http://schemas.microsoft.com/office/drawing/2014/main" id="{EEDEC3E3-6E26-4C59-AA10-C8EB32928B40}"/>
+              </a:ext>
+            </a:extLst>
+          </p:cNvPr>
+          <p:cNvSpPr txBox="1"/>
+          <p:nvPr/>
+        </p:nvSpPr>
+        <p:spPr>
+          <a:xfrm>
+            <a:off x="1292087" y="1858397"/>
+            <a:ext cx="4969565" cy="954107"/>
+          </a:xfrm>
+          <a:prstGeom prst="rect">
+            <a:avLst/>
+          </a:prstGeom>
+          <a:noFill/>
+        </p:spPr>
+        <p:txBody>
+          <a:bodyPr wrap="square" rtlCol="0">
+            <a:spAutoFit/>
+          </a:bodyPr>
+          <a:lstStyle/>
+          <a:p>
+            <a:r>
+              <a:rPr lang="en-US" sz="2800" dirty="0">
+                <a:latin typeface="Bahnschrift SemiBold" panose="020B0502040204020203" pitchFamily="34" charset="0"/>
+              </a:rPr>
+              <a:t>Users can select their required part. </a:t>
+            </a:r>
+          </a:p>
+        </p:txBody>
+      </p:sp>
+      <p:pic>
+        <p:nvPicPr>
+          <p:cNvPr id="4" name="Picture 3">
+            <a:extLst>
+              <a:ext uri="{FF2B5EF4-FFF2-40B4-BE49-F238E27FC236}">
+                <a16:creationId xmlns:a16="http://schemas.microsoft.com/office/drawing/2014/main" id="{EADFCA88-0495-4EB3-BF05-BAE953153898}"/>
+              </a:ext>
+            </a:extLst>
+          </p:cNvPr>
+          <p:cNvPicPr>
+            <a:picLocks noChangeAspect="1"/>
+          </p:cNvPicPr>
+          <p:nvPr/>
+        </p:nvPicPr>
+        <p:blipFill>
+          <a:blip r:embed="rId2"/>
+          <a:stretch>
+            <a:fillRect/>
+          </a:stretch>
+        </p:blipFill>
+        <p:spPr>
+          <a:xfrm>
+            <a:off x="5360286" y="651386"/>
+            <a:ext cx="5489931" cy="5739474"/>
+          </a:xfrm>
+          <a:prstGeom prst="rect">
+            <a:avLst/>
+          </a:prstGeom>
+        </p:spPr>
+      </p:pic>
+    </p:spTree>
+    <p:extLst>
+      <p:ext uri="{BB962C8B-B14F-4D97-AF65-F5344CB8AC3E}">
+        <p14:creationId xmlns:p14="http://schemas.microsoft.com/office/powerpoint/2010/main" val="301851867"/>
+      </p:ext>
+    </p:extLst>
+  </p:cSld>
+  <p:clrMapOvr>
+    <a:masterClrMapping/>
+  </p:clrMapOvr>
+</p:sld>
+</file>
+
+<file path=ppt/slides/slide8.xml><?xml version="1.0" encoding="utf-8"?>
+<p:sld xmlns:a="http://schemas.openxmlformats.org/drawingml/2006/main" xmlns:r="http://schemas.openxmlformats.org/officeDocument/2006/relationships" xmlns:p="http://schemas.openxmlformats.org/presentationml/2006/main">
+  <p:cSld>
+    <p:spTree>
+      <p:nvGrpSpPr>
+        <p:cNvPr id="1" name=""/>
+        <p:cNvGrpSpPr/>
+        <p:nvPr/>
+      </p:nvGrpSpPr>
+      <p:grpSpPr>
+        <a:xfrm>
+          <a:off x="0" y="0"/>
+          <a:ext cx="0" cy="0"/>
+          <a:chOff x="0" y="0"/>
+          <a:chExt cx="0" cy="0"/>
+        </a:xfrm>
+      </p:grpSpPr>
+      <p:sp>
+        <p:nvSpPr>
+          <p:cNvPr id="2" name="TextBox 1">
+            <a:extLst>
+              <a:ext uri="{FF2B5EF4-FFF2-40B4-BE49-F238E27FC236}">
+                <a16:creationId xmlns:a16="http://schemas.microsoft.com/office/drawing/2014/main" id="{35C40C1A-BD3F-4459-BD9A-077147F1EA66}"/>
+              </a:ext>
+            </a:extLst>
+          </p:cNvPr>
+          <p:cNvSpPr txBox="1"/>
+          <p:nvPr/>
+        </p:nvSpPr>
+        <p:spPr>
+          <a:xfrm>
+            <a:off x="1212574" y="464504"/>
+            <a:ext cx="5377069" cy="707886"/>
+          </a:xfrm>
+          <a:prstGeom prst="rect">
+            <a:avLst/>
+          </a:prstGeom>
+          <a:noFill/>
+        </p:spPr>
+        <p:txBody>
+          <a:bodyPr wrap="square" rtlCol="0">
+            <a:spAutoFit/>
+          </a:bodyPr>
+          <a:lstStyle/>
+          <a:p>
+            <a:r>
+              <a:rPr lang="en-US" sz="4000" b="1" dirty="0">
+                <a:latin typeface="Consolas" panose="020B0609020204030204" pitchFamily="49" charset="0"/>
+              </a:rPr>
+              <a:t>Typing Tutorial</a:t>
+            </a:r>
+          </a:p>
+        </p:txBody>
+      </p:sp>
+      <p:sp>
+        <p:nvSpPr>
+          <p:cNvPr id="7" name="TextBox 6">
+            <a:extLst>
+              <a:ext uri="{FF2B5EF4-FFF2-40B4-BE49-F238E27FC236}">
+                <a16:creationId xmlns:a16="http://schemas.microsoft.com/office/drawing/2014/main" id="{1D841475-1A0A-41A8-A542-9C66DC7FEC92}"/>
+              </a:ext>
+            </a:extLst>
+          </p:cNvPr>
+          <p:cNvSpPr txBox="1"/>
+          <p:nvPr/>
+        </p:nvSpPr>
+        <p:spPr>
+          <a:xfrm>
+            <a:off x="1270553" y="1467793"/>
+            <a:ext cx="9650894" cy="892552"/>
+          </a:xfrm>
+          <a:prstGeom prst="rect">
+            <a:avLst/>
+          </a:prstGeom>
+          <a:noFill/>
+        </p:spPr>
+        <p:txBody>
+          <a:bodyPr wrap="square" rtlCol="0">
+            <a:spAutoFit/>
+          </a:bodyPr>
+          <a:lstStyle/>
+          <a:p>
+            <a:pPr marL="457200" indent="-457200">
+              <a:buFont typeface="Wingdings" panose="05000000000000000000" pitchFamily="2" charset="2"/>
+              <a:buChar char="q"/>
+            </a:pPr>
+            <a:r>
+              <a:rPr lang="en-US" sz="2600" dirty="0">
+                <a:latin typeface="Bahnschrift SemiBold" panose="020B0502040204020203" pitchFamily="34" charset="0"/>
+                <a:ea typeface="Cascadia Code" panose="020B0609020000020004" pitchFamily="49" charset="0"/>
+                <a:cs typeface="Cascadia Code" panose="020B0609020000020004" pitchFamily="49" charset="0"/>
+              </a:rPr>
+              <a:t>All keys are divided into 5 lessons</a:t>
+            </a:r>
+          </a:p>
+          <a:p>
+            <a:pPr marL="457200" indent="-457200">
+              <a:buFont typeface="Wingdings" panose="05000000000000000000" pitchFamily="2" charset="2"/>
+              <a:buChar char="q"/>
+            </a:pPr>
+            <a:r>
+              <a:rPr lang="en-US" sz="2600" dirty="0">
+                <a:latin typeface="Bahnschrift SemiBold" panose="020B0502040204020203" pitchFamily="34" charset="0"/>
+                <a:ea typeface="Cascadia Code" panose="020B0609020000020004" pitchFamily="49" charset="0"/>
+                <a:cs typeface="Cascadia Code" panose="020B0609020000020004" pitchFamily="49" charset="0"/>
+              </a:rPr>
+              <a:t>Some common words to practice</a:t>
+            </a:r>
+          </a:p>
+        </p:txBody>
+      </p:sp>
+      <p:pic>
+        <p:nvPicPr>
+          <p:cNvPr id="14" name="Picture 13">
+            <a:extLst>
+              <a:ext uri="{FF2B5EF4-FFF2-40B4-BE49-F238E27FC236}">
+                <a16:creationId xmlns:a16="http://schemas.microsoft.com/office/drawing/2014/main" id="{683BE630-CD7E-4F9B-BF76-DF6478F4327F}"/>
+              </a:ext>
+            </a:extLst>
+          </p:cNvPr>
+          <p:cNvPicPr>
+            <a:picLocks noChangeAspect="1"/>
+          </p:cNvPicPr>
+          <p:nvPr/>
+        </p:nvPicPr>
+        <p:blipFill>
+          <a:blip r:embed="rId2"/>
+          <a:stretch>
+            <a:fillRect/>
+          </a:stretch>
+        </p:blipFill>
+        <p:spPr>
+          <a:xfrm>
+            <a:off x="2281379" y="2655748"/>
+            <a:ext cx="7629241" cy="3984537"/>
+          </a:xfrm>
+          <a:prstGeom prst="rect">
+            <a:avLst/>
+          </a:prstGeom>
+        </p:spPr>
+      </p:pic>
+    </p:spTree>
+    <p:extLst>
+      <p:ext uri="{BB962C8B-B14F-4D97-AF65-F5344CB8AC3E}">
+        <p14:creationId xmlns:p14="http://schemas.microsoft.com/office/powerpoint/2010/main" val="705995340"/>
+      </p:ext>
+    </p:extLst>
+  </p:cSld>
+  <p:clrMapOvr>
+    <a:masterClrMapping/>
+  </p:clrMapOvr>
+</p:sld>
+</file>
+
+<file path=ppt/slides/slide9.xml><?xml version="1.0" encoding="utf-8"?>
+<p:sld xmlns:a="http://schemas.openxmlformats.org/drawingml/2006/main" xmlns:r="http://schemas.openxmlformats.org/officeDocument/2006/relationships" xmlns:p="http://schemas.openxmlformats.org/presentationml/2006/main">
+  <p:cSld>
+    <p:spTree>
+      <p:nvGrpSpPr>
+        <p:cNvPr id="1" name=""/>
+        <p:cNvGrpSpPr/>
+        <p:nvPr/>
+      </p:nvGrpSpPr>
+      <p:grpSpPr>
+        <a:xfrm>
+          <a:off x="0" y="0"/>
+          <a:ext cx="0" cy="0"/>
+          <a:chOff x="0" y="0"/>
+          <a:chExt cx="0" cy="0"/>
+        </a:xfrm>
+      </p:grpSpPr>
+      <p:sp>
+        <p:nvSpPr>
+          <p:cNvPr id="2" name="TextBox 1">
+            <a:extLst>
+              <a:ext uri="{FF2B5EF4-FFF2-40B4-BE49-F238E27FC236}">
+                <a16:creationId xmlns:a16="http://schemas.microsoft.com/office/drawing/2014/main" id="{FC845461-E331-4685-A6A3-630F91C40F9C}"/>
+              </a:ext>
+            </a:extLst>
+          </p:cNvPr>
+          <p:cNvSpPr txBox="1"/>
+          <p:nvPr/>
+        </p:nvSpPr>
+        <p:spPr>
+          <a:xfrm>
+            <a:off x="1432346" y="575806"/>
+            <a:ext cx="6914321" cy="769441"/>
+          </a:xfrm>
+          <a:prstGeom prst="rect">
+            <a:avLst/>
+          </a:prstGeom>
+          <a:noFill/>
+        </p:spPr>
+        <p:txBody>
+          <a:bodyPr wrap="square" rtlCol="0">
+            <a:spAutoFit/>
+          </a:bodyPr>
+          <a:lstStyle/>
+          <a:p>
+            <a:r>
+              <a:rPr lang="en-US" sz="4400" b="1" dirty="0">
+                <a:latin typeface="Consolas" panose="020B0609020204030204" pitchFamily="49" charset="0"/>
+              </a:rPr>
+              <a:t>Feature in each</a:t>
+            </a:r>
+            <a:r>
+              <a:rPr lang="bn-IN" sz="4400" b="1" dirty="0">
+                <a:latin typeface="Consolas" panose="020B0609020204030204" pitchFamily="49" charset="0"/>
+              </a:rPr>
+              <a:t> </a:t>
+            </a:r>
+            <a:r>
+              <a:rPr lang="en-US" sz="4400" b="1" dirty="0">
+                <a:latin typeface="Consolas" panose="020B0609020204030204" pitchFamily="49" charset="0"/>
+              </a:rPr>
+              <a:t>Lesson</a:t>
+            </a:r>
+          </a:p>
+        </p:txBody>
+      </p:sp>
+      <p:sp>
+        <p:nvSpPr>
+          <p:cNvPr id="7" name="TextBox 6">
+            <a:extLst>
+              <a:ext uri="{FF2B5EF4-FFF2-40B4-BE49-F238E27FC236}">
+                <a16:creationId xmlns:a16="http://schemas.microsoft.com/office/drawing/2014/main" id="{F7C1FE18-185D-4410-8941-3E39CD9B6F8B}"/>
+              </a:ext>
+            </a:extLst>
+          </p:cNvPr>
+          <p:cNvSpPr txBox="1"/>
+          <p:nvPr/>
+        </p:nvSpPr>
+        <p:spPr>
+          <a:xfrm>
+            <a:off x="1432346" y="1639469"/>
+            <a:ext cx="9629907" cy="1231106"/>
+          </a:xfrm>
+          <a:prstGeom prst="rect">
+            <a:avLst/>
+          </a:prstGeom>
+          <a:noFill/>
+        </p:spPr>
+        <p:txBody>
+          <a:bodyPr wrap="square" rtlCol="0">
+            <a:spAutoFit/>
+          </a:bodyPr>
+          <a:lstStyle/>
+          <a:p>
+            <a:pPr marL="457200" indent="-457200">
+              <a:buFont typeface="Wingdings" panose="05000000000000000000" pitchFamily="2" charset="2"/>
+              <a:buChar char="ü"/>
+            </a:pPr>
+            <a:r>
+              <a:rPr lang="en-US" sz="2600" dirty="0">
+                <a:latin typeface="Bahnschrift SemiBold" panose="020B0502040204020203" pitchFamily="34" charset="0"/>
+                <a:ea typeface="Cascadia Code" panose="020B0609020000020004" pitchFamily="49" charset="0"/>
+                <a:cs typeface="Cascadia Code" panose="020B0609020000020004" pitchFamily="49" charset="0"/>
+              </a:rPr>
+              <a:t>Interactively learn the keys</a:t>
+            </a:r>
+          </a:p>
+          <a:p>
+            <a:pPr marL="457200" indent="-457200">
+              <a:buFont typeface="Wingdings" panose="05000000000000000000" pitchFamily="2" charset="2"/>
+              <a:buChar char="ü"/>
+            </a:pPr>
+            <a:r>
+              <a:rPr lang="en-US" sz="2600" dirty="0">
+                <a:latin typeface="Bahnschrift SemiBold" panose="020B0502040204020203" pitchFamily="34" charset="0"/>
+                <a:ea typeface="Cascadia Code" panose="020B0609020000020004" pitchFamily="49" charset="0"/>
+                <a:cs typeface="Cascadia Code" panose="020B0609020000020004" pitchFamily="49" charset="0"/>
+              </a:rPr>
+              <a:t>Practice on some randomly generated keys / words</a:t>
+            </a:r>
+          </a:p>
+          <a:p>
+            <a:endParaRPr lang="en-US" sz="2200" dirty="0">
+              <a:latin typeface="Bahnschrift SemiBold" panose="020B0502040204020203" pitchFamily="34" charset="0"/>
+            </a:endParaRPr>
+          </a:p>
+        </p:txBody>
+      </p:sp>
+      <p:pic>
+        <p:nvPicPr>
+          <p:cNvPr id="4" name="Picture 3">
+            <a:extLst>
+              <a:ext uri="{FF2B5EF4-FFF2-40B4-BE49-F238E27FC236}">
+                <a16:creationId xmlns:a16="http://schemas.microsoft.com/office/drawing/2014/main" id="{FF4EC3D3-8DF9-4127-8362-859CFF090579}"/>
+              </a:ext>
+            </a:extLst>
+          </p:cNvPr>
+          <p:cNvPicPr>
+            <a:picLocks noChangeAspect="1"/>
+          </p:cNvPicPr>
+          <p:nvPr/>
+        </p:nvPicPr>
+        <p:blipFill>
+          <a:blip r:embed="rId2"/>
+          <a:stretch>
+            <a:fillRect/>
+          </a:stretch>
+        </p:blipFill>
+        <p:spPr>
+          <a:xfrm>
+            <a:off x="2466016" y="3012267"/>
+            <a:ext cx="6287045" cy="3398959"/>
+          </a:xfrm>
+          <a:prstGeom prst="rect">
+            <a:avLst/>
+          </a:prstGeom>
+        </p:spPr>
+      </p:pic>
+    </p:spTree>
+    <p:extLst>
+      <p:ext uri="{BB962C8B-B14F-4D97-AF65-F5344CB8AC3E}">
+        <p14:creationId xmlns:p14="http://schemas.microsoft.com/office/powerpoint/2010/main" val="2091511458"/>
       </p:ext>
     </p:extLst>
   </p:cSld>
@@ -7065,4 +8448,47 @@
     </a:ext>
   </a:extLst>
 </a:theme>
+</file>
+
+<file path=ppt/theme/themeOverride1.xml><?xml version="1.0" encoding="utf-8"?>
+<a:themeOverride xmlns:a="http://schemas.openxmlformats.org/drawingml/2006/main">
+  <a:clrScheme name="Madison">
+    <a:dk1>
+      <a:sysClr val="windowText" lastClr="000000"/>
+    </a:dk1>
+    <a:lt1>
+      <a:sysClr val="window" lastClr="FFFFFF"/>
+    </a:lt1>
+    <a:dk2>
+      <a:srgbClr val="1F2D29"/>
+    </a:dk2>
+    <a:lt2>
+      <a:srgbClr val="C5FAEB"/>
+    </a:lt2>
+    <a:accent1>
+      <a:srgbClr val="A1D68B"/>
+    </a:accent1>
+    <a:accent2>
+      <a:srgbClr val="5EC795"/>
+    </a:accent2>
+    <a:accent3>
+      <a:srgbClr val="4DADCF"/>
+    </a:accent3>
+    <a:accent4>
+      <a:srgbClr val="CDB756"/>
+    </a:accent4>
+    <a:accent5>
+      <a:srgbClr val="E29C36"/>
+    </a:accent5>
+    <a:accent6>
+      <a:srgbClr val="8EC0C1"/>
+    </a:accent6>
+    <a:hlink>
+      <a:srgbClr val="6D9D9B"/>
+    </a:hlink>
+    <a:folHlink>
+      <a:srgbClr val="6D8583"/>
+    </a:folHlink>
+  </a:clrScheme>
+</a:themeOverride>
 </file>
</xml_diff>

<commit_message>
final update on PRESENTATION SLIDE
</commit_message>
<xml_diff>
--- a/Mid Presentation.pptx
+++ b/Mid Presentation.pptx
@@ -5,7 +5,7 @@
     <p:sldMasterId id="2147483648" r:id="rId1"/>
   </p:sldMasterIdLst>
   <p:notesMasterIdLst>
-    <p:notesMasterId r:id="rId21"/>
+    <p:notesMasterId r:id="rId22"/>
   </p:notesMasterIdLst>
   <p:sldIdLst>
     <p:sldId id="258" r:id="rId2"/>
@@ -26,7 +26,8 @@
     <p:sldId id="277" r:id="rId17"/>
     <p:sldId id="270" r:id="rId18"/>
     <p:sldId id="272" r:id="rId19"/>
-    <p:sldId id="276" r:id="rId20"/>
+    <p:sldId id="278" r:id="rId20"/>
+    <p:sldId id="276" r:id="rId21"/>
   </p:sldIdLst>
   <p:sldSz cx="12192000" cy="6858000"/>
   <p:notesSz cx="6858000" cy="9144000"/>
@@ -215,7 +216,7 @@
           <a:p>
             <a:fld id="{1DDADBE3-1417-4B97-828D-BDCB742D4EDD}" type="datetimeFigureOut">
               <a:rPr lang="en-US" smtClean="0"/>
-              <a:t>08-Sep-23</a:t>
+              <a:t>09-Sep-23</a:t>
             </a:fld>
             <a:endParaRPr lang="en-US"/>
           </a:p>
@@ -699,7 +700,7 @@
           <a:p>
             <a:fld id="{9AB3A824-1A51-4B26-AD58-A6D8E14F6C04}" type="datetimeFigureOut">
               <a:rPr lang="en-US" dirty="0"/>
-              <a:t>08-Sep-23</a:t>
+              <a:t>09-Sep-23</a:t>
             </a:fld>
             <a:endParaRPr lang="en-US" dirty="0"/>
           </a:p>
@@ -1033,7 +1034,7 @@
           <a:p>
             <a:fld id="{D857E33E-8B18-4087-B112-809917729534}" type="datetimeFigureOut">
               <a:rPr lang="en-US" dirty="0"/>
-              <a:t>08-Sep-23</a:t>
+              <a:t>09-Sep-23</a:t>
             </a:fld>
             <a:endParaRPr lang="en-US" dirty="0"/>
           </a:p>
@@ -1335,7 +1336,7 @@
           <a:p>
             <a:fld id="{D3FFE419-2371-464F-8239-3959401C3561}" type="datetimeFigureOut">
               <a:rPr lang="en-US" dirty="0"/>
-              <a:t>08-Sep-23</a:t>
+              <a:t>09-Sep-23</a:t>
             </a:fld>
             <a:endParaRPr lang="en-US" dirty="0"/>
           </a:p>
@@ -1582,7 +1583,7 @@
           <a:p>
             <a:fld id="{97D162C4-EDD9-4389-A98B-B87ECEA2A816}" type="datetimeFigureOut">
               <a:rPr lang="en-US" dirty="0"/>
-              <a:t>08-Sep-23</a:t>
+              <a:t>09-Sep-23</a:t>
             </a:fld>
             <a:endParaRPr lang="en-US" dirty="0"/>
           </a:p>
@@ -1989,7 +1990,7 @@
           <a:p>
             <a:fld id="{3E5059C3-6A89-4494-99FF-5A4D6FFD50EB}" type="datetimeFigureOut">
               <a:rPr lang="en-US" dirty="0"/>
-              <a:t>08-Sep-23</a:t>
+              <a:t>09-Sep-23</a:t>
             </a:fld>
             <a:endParaRPr lang="en-US" dirty="0"/>
           </a:p>
@@ -2303,7 +2304,7 @@
           <a:p>
             <a:fld id="{CA954B2F-12DE-47F5-8894-472B206D2E1E}" type="datetimeFigureOut">
               <a:rPr lang="en-US" dirty="0"/>
-              <a:t>08-Sep-23</a:t>
+              <a:t>09-Sep-23</a:t>
             </a:fld>
             <a:endParaRPr lang="en-US" dirty="0"/>
           </a:p>
@@ -2847,7 +2848,7 @@
           <a:p>
             <a:fld id="{3F30E46F-7819-4ACF-B48B-48222C2ACC88}" type="datetimeFigureOut">
               <a:rPr lang="en-US" dirty="0"/>
-              <a:t>08-Sep-23</a:t>
+              <a:t>09-Sep-23</a:t>
             </a:fld>
             <a:endParaRPr lang="en-US" dirty="0"/>
           </a:p>
@@ -3042,7 +3043,7 @@
           <a:p>
             <a:fld id="{1FAF3416-4057-4DAA-829D-4CA07428D088}" type="datetimeFigureOut">
               <a:rPr lang="en-US" dirty="0"/>
-              <a:t>08-Sep-23</a:t>
+              <a:t>09-Sep-23</a:t>
             </a:fld>
             <a:endParaRPr lang="en-US" dirty="0"/>
           </a:p>
@@ -3255,7 +3256,7 @@
           <a:p>
             <a:fld id="{921D9284-D300-4297-87F7-E791DCC15DB1}" type="datetimeFigureOut">
               <a:rPr lang="en-US" dirty="0"/>
-              <a:t>08-Sep-23</a:t>
+              <a:t>09-Sep-23</a:t>
             </a:fld>
             <a:endParaRPr lang="en-US" dirty="0"/>
           </a:p>
@@ -3624,7 +3625,7 @@
           <a:p>
             <a:fld id="{37D525BB-DA17-4BA0-B3C8-3AC3ABC827E6}" type="datetimeFigureOut">
               <a:rPr lang="en-US" dirty="0"/>
-              <a:t>08-Sep-23</a:t>
+              <a:t>09-Sep-23</a:t>
             </a:fld>
             <a:endParaRPr lang="en-US" dirty="0"/>
           </a:p>
@@ -4027,7 +4028,7 @@
           <a:p>
             <a:fld id="{B16C4C9A-3960-41CF-A4E9-2A8FB932454B}" type="datetimeFigureOut">
               <a:rPr lang="en-US" dirty="0"/>
-              <a:t>08-Sep-23</a:t>
+              <a:t>09-Sep-23</a:t>
             </a:fld>
             <a:endParaRPr lang="en-US" dirty="0"/>
           </a:p>
@@ -4338,7 +4339,7 @@
           <a:p>
             <a:fld id="{3CBC1C18-307B-4F68-A007-B5B542270E8D}" type="datetimeFigureOut">
               <a:rPr lang="en-US" dirty="0"/>
-              <a:t>08-Sep-23</a:t>
+              <a:t>09-Sep-23</a:t>
             </a:fld>
             <a:endParaRPr lang="en-US" dirty="0"/>
           </a:p>
@@ -6626,7 +6627,7 @@
           <p:cNvPr id="2" name="TextBox 1">
             <a:extLst>
               <a:ext uri="{FF2B5EF4-FFF2-40B4-BE49-F238E27FC236}">
-                <a16:creationId xmlns:a16="http://schemas.microsoft.com/office/drawing/2014/main" id="{6F71F49E-7E92-4FEC-99A7-DC87E227310A}"/>
+                <a16:creationId xmlns:a16="http://schemas.microsoft.com/office/drawing/2014/main" id="{690440DA-BDC4-480B-972E-E97E193BA961}"/>
               </a:ext>
             </a:extLst>
           </p:cNvPr>
@@ -6635,8 +6636,8 @@
         </p:nvSpPr>
         <p:spPr>
           <a:xfrm>
-            <a:off x="2676938" y="2524539"/>
-            <a:ext cx="8309113" cy="1311128"/>
+            <a:off x="4204251" y="168966"/>
+            <a:ext cx="10237305" cy="923330"/>
           </a:xfrm>
           <a:prstGeom prst="rect">
             <a:avLst/>
@@ -6649,24 +6650,15 @@
           </a:bodyPr>
           <a:lstStyle/>
           <a:p>
-            <a:pPr algn="just" defTabSz="914400">
-              <a:lnSpc>
-                <a:spcPct val="90000"/>
-              </a:lnSpc>
-              <a:spcBef>
-                <a:spcPct val="0"/>
-              </a:spcBef>
-            </a:pPr>
-            <a:r>
-              <a:rPr lang="en" sz="8800" dirty="0">
+            <a:r>
+              <a:rPr lang="en-US" sz="5400" dirty="0">
                 <a:latin typeface="Arial Rounded MT Bold" panose="020F0704030504030204" pitchFamily="34" charset="0"/>
                 <a:ea typeface="+mj-ea"/>
                 <a:cs typeface="+mj-cs"/>
-                <a:sym typeface="Maven Pro"/>
               </a:rPr>
-              <a:t>Thank You</a:t>
-            </a:r>
-            <a:endParaRPr lang="en-US" sz="8800" dirty="0">
+              <a:t>Summary</a:t>
+            </a:r>
+            <a:endParaRPr lang="en-US" sz="6500" dirty="0">
               <a:latin typeface="Arial Rounded MT Bold" panose="020F0704030504030204" pitchFamily="34" charset="0"/>
               <a:ea typeface="+mj-ea"/>
               <a:cs typeface="+mj-cs"/>
@@ -6674,10 +6666,99 @@
           </a:p>
         </p:txBody>
       </p:sp>
+      <p:pic>
+        <p:nvPicPr>
+          <p:cNvPr id="4" name="Picture 3">
+            <a:extLst>
+              <a:ext uri="{FF2B5EF4-FFF2-40B4-BE49-F238E27FC236}">
+                <a16:creationId xmlns:a16="http://schemas.microsoft.com/office/drawing/2014/main" id="{A8135D3C-DC11-46B2-B2F0-F13F82298CA8}"/>
+              </a:ext>
+            </a:extLst>
+          </p:cNvPr>
+          <p:cNvPicPr>
+            <a:picLocks noChangeAspect="1"/>
+          </p:cNvPicPr>
+          <p:nvPr/>
+        </p:nvPicPr>
+        <p:blipFill>
+          <a:blip r:embed="rId2"/>
+          <a:stretch>
+            <a:fillRect/>
+          </a:stretch>
+        </p:blipFill>
+        <p:spPr>
+          <a:xfrm>
+            <a:off x="114177" y="1310957"/>
+            <a:ext cx="11963645" cy="3151713"/>
+          </a:xfrm>
+          <a:prstGeom prst="rect">
+            <a:avLst/>
+          </a:prstGeom>
+        </p:spPr>
+      </p:pic>
+      <p:sp>
+        <p:nvSpPr>
+          <p:cNvPr id="6" name="TextBox 5">
+            <a:extLst>
+              <a:ext uri="{FF2B5EF4-FFF2-40B4-BE49-F238E27FC236}">
+                <a16:creationId xmlns:a16="http://schemas.microsoft.com/office/drawing/2014/main" id="{A20FF874-2503-4BE6-AC17-5D077790B27D}"/>
+              </a:ext>
+            </a:extLst>
+          </p:cNvPr>
+          <p:cNvSpPr txBox="1"/>
+          <p:nvPr/>
+        </p:nvSpPr>
+        <p:spPr>
+          <a:xfrm>
+            <a:off x="2395331" y="5085378"/>
+            <a:ext cx="8010939" cy="523220"/>
+          </a:xfrm>
+          <a:prstGeom prst="rect">
+            <a:avLst/>
+          </a:prstGeom>
+          <a:noFill/>
+        </p:spPr>
+        <p:txBody>
+          <a:bodyPr wrap="square" rtlCol="0">
+            <a:spAutoFit/>
+          </a:bodyPr>
+          <a:lstStyle/>
+          <a:p>
+            <a:r>
+              <a:rPr lang="en-US" sz="2400" dirty="0">
+                <a:latin typeface="Arial Rounded MT Bold" panose="020F0704030504030204" pitchFamily="34" charset="0"/>
+                <a:ea typeface="+mj-ea"/>
+                <a:cs typeface="+mj-cs"/>
+              </a:rPr>
+              <a:t>           GitHub Link of this Project: </a:t>
+            </a:r>
+            <a:r>
+              <a:rPr lang="en-US" sz="2800" dirty="0">
+                <a:latin typeface="Arial Rounded MT Bold" panose="020F0704030504030204" pitchFamily="34" charset="0"/>
+                <a:ea typeface="+mj-ea"/>
+                <a:cs typeface="+mj-cs"/>
+                <a:hlinkClick r:id="rId3">
+                  <a:extLst>
+                    <a:ext uri="{A12FA001-AC4F-418D-AE19-62706E023703}">
+                      <ahyp:hlinkClr xmlns:ahyp="http://schemas.microsoft.com/office/drawing/2018/hyperlinkcolor" val="tx"/>
+                    </a:ext>
+                  </a:extLst>
+                </a:hlinkClick>
+              </a:rPr>
+              <a:t>SPL - 1</a:t>
+            </a:r>
+            <a:endParaRPr lang="en-US" sz="2400" dirty="0">
+              <a:latin typeface="Arial Rounded MT Bold" panose="020F0704030504030204" pitchFamily="34" charset="0"/>
+              <a:ea typeface="+mj-ea"/>
+              <a:cs typeface="+mj-cs"/>
+            </a:endParaRPr>
+          </a:p>
+        </p:txBody>
+      </p:sp>
     </p:spTree>
     <p:extLst>
       <p:ext uri="{BB962C8B-B14F-4D97-AF65-F5344CB8AC3E}">
-        <p14:creationId xmlns:p14="http://schemas.microsoft.com/office/powerpoint/2010/main" val="2535942500"/>
+        <p14:creationId xmlns:p14="http://schemas.microsoft.com/office/powerpoint/2010/main" val="1336826958"/>
       </p:ext>
     </p:extLst>
   </p:cSld>
@@ -6836,6 +6917,89 @@
     <p:extLst>
       <p:ext uri="{BB962C8B-B14F-4D97-AF65-F5344CB8AC3E}">
         <p14:creationId xmlns:p14="http://schemas.microsoft.com/office/powerpoint/2010/main" val="3381324096"/>
+      </p:ext>
+    </p:extLst>
+  </p:cSld>
+  <p:clrMapOvr>
+    <a:masterClrMapping/>
+  </p:clrMapOvr>
+</p:sld>
+</file>
+
+<file path=ppt/slides/slide20.xml><?xml version="1.0" encoding="utf-8"?>
+<p:sld xmlns:a="http://schemas.openxmlformats.org/drawingml/2006/main" xmlns:r="http://schemas.openxmlformats.org/officeDocument/2006/relationships" xmlns:p="http://schemas.openxmlformats.org/presentationml/2006/main">
+  <p:cSld>
+    <p:spTree>
+      <p:nvGrpSpPr>
+        <p:cNvPr id="1" name=""/>
+        <p:cNvGrpSpPr/>
+        <p:nvPr/>
+      </p:nvGrpSpPr>
+      <p:grpSpPr>
+        <a:xfrm>
+          <a:off x="0" y="0"/>
+          <a:ext cx="0" cy="0"/>
+          <a:chOff x="0" y="0"/>
+          <a:chExt cx="0" cy="0"/>
+        </a:xfrm>
+      </p:grpSpPr>
+      <p:sp>
+        <p:nvSpPr>
+          <p:cNvPr id="2" name="TextBox 1">
+            <a:extLst>
+              <a:ext uri="{FF2B5EF4-FFF2-40B4-BE49-F238E27FC236}">
+                <a16:creationId xmlns:a16="http://schemas.microsoft.com/office/drawing/2014/main" id="{6F71F49E-7E92-4FEC-99A7-DC87E227310A}"/>
+              </a:ext>
+            </a:extLst>
+          </p:cNvPr>
+          <p:cNvSpPr txBox="1"/>
+          <p:nvPr/>
+        </p:nvSpPr>
+        <p:spPr>
+          <a:xfrm>
+            <a:off x="2676938" y="2524539"/>
+            <a:ext cx="8309113" cy="1311128"/>
+          </a:xfrm>
+          <a:prstGeom prst="rect">
+            <a:avLst/>
+          </a:prstGeom>
+          <a:noFill/>
+        </p:spPr>
+        <p:txBody>
+          <a:bodyPr wrap="square" rtlCol="0">
+            <a:spAutoFit/>
+          </a:bodyPr>
+          <a:lstStyle/>
+          <a:p>
+            <a:pPr algn="just" defTabSz="914400">
+              <a:lnSpc>
+                <a:spcPct val="90000"/>
+              </a:lnSpc>
+              <a:spcBef>
+                <a:spcPct val="0"/>
+              </a:spcBef>
+            </a:pPr>
+            <a:r>
+              <a:rPr lang="en" sz="8800" dirty="0">
+                <a:latin typeface="Arial Rounded MT Bold" panose="020F0704030504030204" pitchFamily="34" charset="0"/>
+                <a:ea typeface="+mj-ea"/>
+                <a:cs typeface="+mj-cs"/>
+                <a:sym typeface="Maven Pro"/>
+              </a:rPr>
+              <a:t>Thank You</a:t>
+            </a:r>
+            <a:endParaRPr lang="en-US" sz="8800" dirty="0">
+              <a:latin typeface="Arial Rounded MT Bold" panose="020F0704030504030204" pitchFamily="34" charset="0"/>
+              <a:ea typeface="+mj-ea"/>
+              <a:cs typeface="+mj-cs"/>
+            </a:endParaRPr>
+          </a:p>
+        </p:txBody>
+      </p:sp>
+    </p:spTree>
+    <p:extLst>
+      <p:ext uri="{BB962C8B-B14F-4D97-AF65-F5344CB8AC3E}">
+        <p14:creationId xmlns:p14="http://schemas.microsoft.com/office/powerpoint/2010/main" val="2535942500"/>
       </p:ext>
     </p:extLst>
   </p:cSld>

</xml_diff>